<commit_message>
Minor fixies in programozók világa
</commit_message>
<xml_diff>
--- a/efop/03/Programozók világa.pptx
+++ b/efop/03/Programozók világa.pptx
@@ -112,6 +112,11 @@
       </a:defRPr>
     </a:lvl9pPr>
   </p:defaultTextStyle>
+  <p:extLst>
+    <p:ext uri="{EFAFB233-063F-42B5-8137-9DF3F51BA10A}">
+      <p15:sldGuideLst xmlns:p15="http://schemas.microsoft.com/office/powerpoint/2012/main"/>
+    </p:ext>
+  </p:extLst>
 </p:presentation>
 </file>
 
@@ -157,7 +162,7 @@
           </a:lstStyle>
           <a:p>
             <a:r>
-              <a:rPr lang="en-US" smtClean="0"/>
+              <a:rPr lang="en-US"/>
               <a:t>Click to edit Master title style</a:t>
             </a:r>
             <a:endParaRPr lang="hu-HU"/>
@@ -222,7 +227,7 @@
           </a:lstStyle>
           <a:p>
             <a:r>
-              <a:rPr lang="en-US" smtClean="0"/>
+              <a:rPr lang="en-US"/>
               <a:t>Click to edit Master subtitle style</a:t>
             </a:r>
             <a:endParaRPr lang="hu-HU"/>
@@ -246,7 +251,7 @@
           <a:p>
             <a:fld id="{20357631-FF36-4D82-B011-A26686633743}" type="datetimeFigureOut">
               <a:rPr lang="hu-HU" smtClean="0"/>
-              <a:t>2018.09.28.</a:t>
+              <a:t>2018. 09. 30.</a:t>
             </a:fld>
             <a:endParaRPr lang="hu-HU"/>
           </a:p>
@@ -340,7 +345,7 @@
           <a:lstStyle/>
           <a:p>
             <a:r>
-              <a:rPr lang="en-US" smtClean="0"/>
+              <a:rPr lang="en-US"/>
               <a:t>Click to edit Master title style</a:t>
             </a:r>
             <a:endParaRPr lang="hu-HU"/>
@@ -364,35 +369,35 @@
           <a:p>
             <a:pPr lvl="0"/>
             <a:r>
-              <a:rPr lang="en-US" smtClean="0"/>
+              <a:rPr lang="en-US"/>
               <a:t>Edit Master text styles</a:t>
             </a:r>
           </a:p>
           <a:p>
             <a:pPr lvl="1"/>
             <a:r>
-              <a:rPr lang="en-US" smtClean="0"/>
+              <a:rPr lang="en-US"/>
               <a:t>Second level</a:t>
             </a:r>
           </a:p>
           <a:p>
             <a:pPr lvl="2"/>
             <a:r>
-              <a:rPr lang="en-US" smtClean="0"/>
+              <a:rPr lang="en-US"/>
               <a:t>Third level</a:t>
             </a:r>
           </a:p>
           <a:p>
             <a:pPr lvl="3"/>
             <a:r>
-              <a:rPr lang="en-US" smtClean="0"/>
+              <a:rPr lang="en-US"/>
               <a:t>Fourth level</a:t>
             </a:r>
           </a:p>
           <a:p>
             <a:pPr lvl="4"/>
             <a:r>
-              <a:rPr lang="en-US" smtClean="0"/>
+              <a:rPr lang="en-US"/>
               <a:t>Fifth level</a:t>
             </a:r>
             <a:endParaRPr lang="hu-HU"/>
@@ -416,7 +421,7 @@
           <a:p>
             <a:fld id="{20357631-FF36-4D82-B011-A26686633743}" type="datetimeFigureOut">
               <a:rPr lang="hu-HU" smtClean="0"/>
-              <a:t>2018.09.28.</a:t>
+              <a:t>2018. 09. 30.</a:t>
             </a:fld>
             <a:endParaRPr lang="hu-HU"/>
           </a:p>
@@ -515,7 +520,7 @@
           <a:lstStyle/>
           <a:p>
             <a:r>
-              <a:rPr lang="en-US" smtClean="0"/>
+              <a:rPr lang="en-US"/>
               <a:t>Click to edit Master title style</a:t>
             </a:r>
             <a:endParaRPr lang="hu-HU"/>
@@ -544,35 +549,35 @@
           <a:p>
             <a:pPr lvl="0"/>
             <a:r>
-              <a:rPr lang="en-US" smtClean="0"/>
+              <a:rPr lang="en-US"/>
               <a:t>Edit Master text styles</a:t>
             </a:r>
           </a:p>
           <a:p>
             <a:pPr lvl="1"/>
             <a:r>
-              <a:rPr lang="en-US" smtClean="0"/>
+              <a:rPr lang="en-US"/>
               <a:t>Second level</a:t>
             </a:r>
           </a:p>
           <a:p>
             <a:pPr lvl="2"/>
             <a:r>
-              <a:rPr lang="en-US" smtClean="0"/>
+              <a:rPr lang="en-US"/>
               <a:t>Third level</a:t>
             </a:r>
           </a:p>
           <a:p>
             <a:pPr lvl="3"/>
             <a:r>
-              <a:rPr lang="en-US" smtClean="0"/>
+              <a:rPr lang="en-US"/>
               <a:t>Fourth level</a:t>
             </a:r>
           </a:p>
           <a:p>
             <a:pPr lvl="4"/>
             <a:r>
-              <a:rPr lang="en-US" smtClean="0"/>
+              <a:rPr lang="en-US"/>
               <a:t>Fifth level</a:t>
             </a:r>
             <a:endParaRPr lang="hu-HU"/>
@@ -596,7 +601,7 @@
           <a:p>
             <a:fld id="{20357631-FF36-4D82-B011-A26686633743}" type="datetimeFigureOut">
               <a:rPr lang="hu-HU" smtClean="0"/>
-              <a:t>2018.09.28.</a:t>
+              <a:t>2018. 09. 30.</a:t>
             </a:fld>
             <a:endParaRPr lang="hu-HU"/>
           </a:p>
@@ -690,7 +695,7 @@
           <a:lstStyle/>
           <a:p>
             <a:r>
-              <a:rPr lang="en-US" smtClean="0"/>
+              <a:rPr lang="en-US"/>
               <a:t>Click to edit Master title style</a:t>
             </a:r>
             <a:endParaRPr lang="hu-HU"/>
@@ -714,35 +719,35 @@
           <a:p>
             <a:pPr lvl="0"/>
             <a:r>
-              <a:rPr lang="en-US" smtClean="0"/>
+              <a:rPr lang="en-US"/>
               <a:t>Edit Master text styles</a:t>
             </a:r>
           </a:p>
           <a:p>
             <a:pPr lvl="1"/>
             <a:r>
-              <a:rPr lang="en-US" smtClean="0"/>
+              <a:rPr lang="en-US"/>
               <a:t>Second level</a:t>
             </a:r>
           </a:p>
           <a:p>
             <a:pPr lvl="2"/>
             <a:r>
-              <a:rPr lang="en-US" smtClean="0"/>
+              <a:rPr lang="en-US"/>
               <a:t>Third level</a:t>
             </a:r>
           </a:p>
           <a:p>
             <a:pPr lvl="3"/>
             <a:r>
-              <a:rPr lang="en-US" smtClean="0"/>
+              <a:rPr lang="en-US"/>
               <a:t>Fourth level</a:t>
             </a:r>
           </a:p>
           <a:p>
             <a:pPr lvl="4"/>
             <a:r>
-              <a:rPr lang="en-US" smtClean="0"/>
+              <a:rPr lang="en-US"/>
               <a:t>Fifth level</a:t>
             </a:r>
             <a:endParaRPr lang="hu-HU"/>
@@ -766,7 +771,7 @@
           <a:p>
             <a:fld id="{20357631-FF36-4D82-B011-A26686633743}" type="datetimeFigureOut">
               <a:rPr lang="hu-HU" smtClean="0"/>
-              <a:t>2018.09.28.</a:t>
+              <a:t>2018. 09. 30.</a:t>
             </a:fld>
             <a:endParaRPr lang="hu-HU"/>
           </a:p>
@@ -869,7 +874,7 @@
           </a:lstStyle>
           <a:p>
             <a:r>
-              <a:rPr lang="en-US" smtClean="0"/>
+              <a:rPr lang="en-US"/>
               <a:t>Click to edit Master title style</a:t>
             </a:r>
             <a:endParaRPr lang="hu-HU"/>
@@ -989,7 +994,7 @@
           <a:p>
             <a:pPr lvl="0"/>
             <a:r>
-              <a:rPr lang="en-US" smtClean="0"/>
+              <a:rPr lang="en-US"/>
               <a:t>Edit Master text styles</a:t>
             </a:r>
           </a:p>
@@ -1012,7 +1017,7 @@
           <a:p>
             <a:fld id="{20357631-FF36-4D82-B011-A26686633743}" type="datetimeFigureOut">
               <a:rPr lang="hu-HU" smtClean="0"/>
-              <a:t>2018.09.28.</a:t>
+              <a:t>2018. 09. 30.</a:t>
             </a:fld>
             <a:endParaRPr lang="hu-HU"/>
           </a:p>
@@ -1106,7 +1111,7 @@
           <a:lstStyle/>
           <a:p>
             <a:r>
-              <a:rPr lang="en-US" smtClean="0"/>
+              <a:rPr lang="en-US"/>
               <a:t>Click to edit Master title style</a:t>
             </a:r>
             <a:endParaRPr lang="hu-HU"/>
@@ -1135,35 +1140,35 @@
           <a:p>
             <a:pPr lvl="0"/>
             <a:r>
-              <a:rPr lang="en-US" smtClean="0"/>
+              <a:rPr lang="en-US"/>
               <a:t>Edit Master text styles</a:t>
             </a:r>
           </a:p>
           <a:p>
             <a:pPr lvl="1"/>
             <a:r>
-              <a:rPr lang="en-US" smtClean="0"/>
+              <a:rPr lang="en-US"/>
               <a:t>Second level</a:t>
             </a:r>
           </a:p>
           <a:p>
             <a:pPr lvl="2"/>
             <a:r>
-              <a:rPr lang="en-US" smtClean="0"/>
+              <a:rPr lang="en-US"/>
               <a:t>Third level</a:t>
             </a:r>
           </a:p>
           <a:p>
             <a:pPr lvl="3"/>
             <a:r>
-              <a:rPr lang="en-US" smtClean="0"/>
+              <a:rPr lang="en-US"/>
               <a:t>Fourth level</a:t>
             </a:r>
           </a:p>
           <a:p>
             <a:pPr lvl="4"/>
             <a:r>
-              <a:rPr lang="en-US" smtClean="0"/>
+              <a:rPr lang="en-US"/>
               <a:t>Fifth level</a:t>
             </a:r>
             <a:endParaRPr lang="hu-HU"/>
@@ -1192,35 +1197,35 @@
           <a:p>
             <a:pPr lvl="0"/>
             <a:r>
-              <a:rPr lang="en-US" smtClean="0"/>
+              <a:rPr lang="en-US"/>
               <a:t>Edit Master text styles</a:t>
             </a:r>
           </a:p>
           <a:p>
             <a:pPr lvl="1"/>
             <a:r>
-              <a:rPr lang="en-US" smtClean="0"/>
+              <a:rPr lang="en-US"/>
               <a:t>Second level</a:t>
             </a:r>
           </a:p>
           <a:p>
             <a:pPr lvl="2"/>
             <a:r>
-              <a:rPr lang="en-US" smtClean="0"/>
+              <a:rPr lang="en-US"/>
               <a:t>Third level</a:t>
             </a:r>
           </a:p>
           <a:p>
             <a:pPr lvl="3"/>
             <a:r>
-              <a:rPr lang="en-US" smtClean="0"/>
+              <a:rPr lang="en-US"/>
               <a:t>Fourth level</a:t>
             </a:r>
           </a:p>
           <a:p>
             <a:pPr lvl="4"/>
             <a:r>
-              <a:rPr lang="en-US" smtClean="0"/>
+              <a:rPr lang="en-US"/>
               <a:t>Fifth level</a:t>
             </a:r>
             <a:endParaRPr lang="hu-HU"/>
@@ -1244,7 +1249,7 @@
           <a:p>
             <a:fld id="{20357631-FF36-4D82-B011-A26686633743}" type="datetimeFigureOut">
               <a:rPr lang="hu-HU" smtClean="0"/>
-              <a:t>2018.09.28.</a:t>
+              <a:t>2018. 09. 30.</a:t>
             </a:fld>
             <a:endParaRPr lang="hu-HU"/>
           </a:p>
@@ -1343,7 +1348,7 @@
           <a:lstStyle/>
           <a:p>
             <a:r>
-              <a:rPr lang="en-US" smtClean="0"/>
+              <a:rPr lang="en-US"/>
               <a:t>Click to edit Master title style</a:t>
             </a:r>
             <a:endParaRPr lang="hu-HU"/>
@@ -1409,7 +1414,7 @@
           <a:p>
             <a:pPr lvl="0"/>
             <a:r>
-              <a:rPr lang="en-US" smtClean="0"/>
+              <a:rPr lang="en-US"/>
               <a:t>Edit Master text styles</a:t>
             </a:r>
           </a:p>
@@ -1437,35 +1442,35 @@
           <a:p>
             <a:pPr lvl="0"/>
             <a:r>
-              <a:rPr lang="en-US" smtClean="0"/>
+              <a:rPr lang="en-US"/>
               <a:t>Edit Master text styles</a:t>
             </a:r>
           </a:p>
           <a:p>
             <a:pPr lvl="1"/>
             <a:r>
-              <a:rPr lang="en-US" smtClean="0"/>
+              <a:rPr lang="en-US"/>
               <a:t>Second level</a:t>
             </a:r>
           </a:p>
           <a:p>
             <a:pPr lvl="2"/>
             <a:r>
-              <a:rPr lang="en-US" smtClean="0"/>
+              <a:rPr lang="en-US"/>
               <a:t>Third level</a:t>
             </a:r>
           </a:p>
           <a:p>
             <a:pPr lvl="3"/>
             <a:r>
-              <a:rPr lang="en-US" smtClean="0"/>
+              <a:rPr lang="en-US"/>
               <a:t>Fourth level</a:t>
             </a:r>
           </a:p>
           <a:p>
             <a:pPr lvl="4"/>
             <a:r>
-              <a:rPr lang="en-US" smtClean="0"/>
+              <a:rPr lang="en-US"/>
               <a:t>Fifth level</a:t>
             </a:r>
             <a:endParaRPr lang="hu-HU"/>
@@ -1531,7 +1536,7 @@
           <a:p>
             <a:pPr lvl="0"/>
             <a:r>
-              <a:rPr lang="en-US" smtClean="0"/>
+              <a:rPr lang="en-US"/>
               <a:t>Edit Master text styles</a:t>
             </a:r>
           </a:p>
@@ -1559,35 +1564,35 @@
           <a:p>
             <a:pPr lvl="0"/>
             <a:r>
-              <a:rPr lang="en-US" smtClean="0"/>
+              <a:rPr lang="en-US"/>
               <a:t>Edit Master text styles</a:t>
             </a:r>
           </a:p>
           <a:p>
             <a:pPr lvl="1"/>
             <a:r>
-              <a:rPr lang="en-US" smtClean="0"/>
+              <a:rPr lang="en-US"/>
               <a:t>Second level</a:t>
             </a:r>
           </a:p>
           <a:p>
             <a:pPr lvl="2"/>
             <a:r>
-              <a:rPr lang="en-US" smtClean="0"/>
+              <a:rPr lang="en-US"/>
               <a:t>Third level</a:t>
             </a:r>
           </a:p>
           <a:p>
             <a:pPr lvl="3"/>
             <a:r>
-              <a:rPr lang="en-US" smtClean="0"/>
+              <a:rPr lang="en-US"/>
               <a:t>Fourth level</a:t>
             </a:r>
           </a:p>
           <a:p>
             <a:pPr lvl="4"/>
             <a:r>
-              <a:rPr lang="en-US" smtClean="0"/>
+              <a:rPr lang="en-US"/>
               <a:t>Fifth level</a:t>
             </a:r>
             <a:endParaRPr lang="hu-HU"/>
@@ -1611,7 +1616,7 @@
           <a:p>
             <a:fld id="{20357631-FF36-4D82-B011-A26686633743}" type="datetimeFigureOut">
               <a:rPr lang="hu-HU" smtClean="0"/>
-              <a:t>2018.09.28.</a:t>
+              <a:t>2018. 09. 30.</a:t>
             </a:fld>
             <a:endParaRPr lang="hu-HU"/>
           </a:p>
@@ -1705,7 +1710,7 @@
           <a:lstStyle/>
           <a:p>
             <a:r>
-              <a:rPr lang="en-US" smtClean="0"/>
+              <a:rPr lang="en-US"/>
               <a:t>Click to edit Master title style</a:t>
             </a:r>
             <a:endParaRPr lang="hu-HU"/>
@@ -1729,7 +1734,7 @@
           <a:p>
             <a:fld id="{20357631-FF36-4D82-B011-A26686633743}" type="datetimeFigureOut">
               <a:rPr lang="hu-HU" smtClean="0"/>
-              <a:t>2018.09.28.</a:t>
+              <a:t>2018. 09. 30.</a:t>
             </a:fld>
             <a:endParaRPr lang="hu-HU"/>
           </a:p>
@@ -1824,7 +1829,7 @@
           <a:p>
             <a:fld id="{20357631-FF36-4D82-B011-A26686633743}" type="datetimeFigureOut">
               <a:rPr lang="hu-HU" smtClean="0"/>
-              <a:t>2018.09.28.</a:t>
+              <a:t>2018. 09. 30.</a:t>
             </a:fld>
             <a:endParaRPr lang="hu-HU"/>
           </a:p>
@@ -1927,7 +1932,7 @@
           </a:lstStyle>
           <a:p>
             <a:r>
-              <a:rPr lang="en-US" smtClean="0"/>
+              <a:rPr lang="en-US"/>
               <a:t>Click to edit Master title style</a:t>
             </a:r>
             <a:endParaRPr lang="hu-HU"/>
@@ -1984,35 +1989,35 @@
           <a:p>
             <a:pPr lvl="0"/>
             <a:r>
-              <a:rPr lang="en-US" smtClean="0"/>
+              <a:rPr lang="en-US"/>
               <a:t>Edit Master text styles</a:t>
             </a:r>
           </a:p>
           <a:p>
             <a:pPr lvl="1"/>
             <a:r>
-              <a:rPr lang="en-US" smtClean="0"/>
+              <a:rPr lang="en-US"/>
               <a:t>Second level</a:t>
             </a:r>
           </a:p>
           <a:p>
             <a:pPr lvl="2"/>
             <a:r>
-              <a:rPr lang="en-US" smtClean="0"/>
+              <a:rPr lang="en-US"/>
               <a:t>Third level</a:t>
             </a:r>
           </a:p>
           <a:p>
             <a:pPr lvl="3"/>
             <a:r>
-              <a:rPr lang="en-US" smtClean="0"/>
+              <a:rPr lang="en-US"/>
               <a:t>Fourth level</a:t>
             </a:r>
           </a:p>
           <a:p>
             <a:pPr lvl="4"/>
             <a:r>
-              <a:rPr lang="en-US" smtClean="0"/>
+              <a:rPr lang="en-US"/>
               <a:t>Fifth level</a:t>
             </a:r>
             <a:endParaRPr lang="hu-HU"/>
@@ -2078,7 +2083,7 @@
           <a:p>
             <a:pPr lvl="0"/>
             <a:r>
-              <a:rPr lang="en-US" smtClean="0"/>
+              <a:rPr lang="en-US"/>
               <a:t>Edit Master text styles</a:t>
             </a:r>
           </a:p>
@@ -2101,7 +2106,7 @@
           <a:p>
             <a:fld id="{20357631-FF36-4D82-B011-A26686633743}" type="datetimeFigureOut">
               <a:rPr lang="hu-HU" smtClean="0"/>
-              <a:t>2018.09.28.</a:t>
+              <a:t>2018. 09. 30.</a:t>
             </a:fld>
             <a:endParaRPr lang="hu-HU"/>
           </a:p>
@@ -2204,7 +2209,7 @@
           </a:lstStyle>
           <a:p>
             <a:r>
-              <a:rPr lang="en-US" smtClean="0"/>
+              <a:rPr lang="en-US"/>
               <a:t>Click to edit Master title style</a:t>
             </a:r>
             <a:endParaRPr lang="hu-HU"/>
@@ -2331,7 +2336,7 @@
           <a:p>
             <a:pPr lvl="0"/>
             <a:r>
-              <a:rPr lang="en-US" smtClean="0"/>
+              <a:rPr lang="en-US"/>
               <a:t>Edit Master text styles</a:t>
             </a:r>
           </a:p>
@@ -2354,7 +2359,7 @@
           <a:p>
             <a:fld id="{20357631-FF36-4D82-B011-A26686633743}" type="datetimeFigureOut">
               <a:rPr lang="hu-HU" smtClean="0"/>
-              <a:t>2018.09.28.</a:t>
+              <a:t>2018. 09. 30.</a:t>
             </a:fld>
             <a:endParaRPr lang="hu-HU"/>
           </a:p>
@@ -2463,7 +2468,7 @@
           <a:lstStyle/>
           <a:p>
             <a:r>
-              <a:rPr lang="en-US" smtClean="0"/>
+              <a:rPr lang="en-US"/>
               <a:t>Click to edit Master title style</a:t>
             </a:r>
             <a:endParaRPr lang="hu-HU"/>
@@ -2497,35 +2502,35 @@
           <a:p>
             <a:pPr lvl="0"/>
             <a:r>
-              <a:rPr lang="en-US" smtClean="0"/>
+              <a:rPr lang="en-US"/>
               <a:t>Edit Master text styles</a:t>
             </a:r>
           </a:p>
           <a:p>
             <a:pPr lvl="1"/>
             <a:r>
-              <a:rPr lang="en-US" smtClean="0"/>
+              <a:rPr lang="en-US"/>
               <a:t>Second level</a:t>
             </a:r>
           </a:p>
           <a:p>
             <a:pPr lvl="2"/>
             <a:r>
-              <a:rPr lang="en-US" smtClean="0"/>
+              <a:rPr lang="en-US"/>
               <a:t>Third level</a:t>
             </a:r>
           </a:p>
           <a:p>
             <a:pPr lvl="3"/>
             <a:r>
-              <a:rPr lang="en-US" smtClean="0"/>
+              <a:rPr lang="en-US"/>
               <a:t>Fourth level</a:t>
             </a:r>
           </a:p>
           <a:p>
             <a:pPr lvl="4"/>
             <a:r>
-              <a:rPr lang="en-US" smtClean="0"/>
+              <a:rPr lang="en-US"/>
               <a:t>Fifth level</a:t>
             </a:r>
             <a:endParaRPr lang="hu-HU"/>
@@ -2567,7 +2572,7 @@
           <a:p>
             <a:fld id="{20357631-FF36-4D82-B011-A26686633743}" type="datetimeFigureOut">
               <a:rPr lang="hu-HU" smtClean="0"/>
-              <a:t>2018.09.28.</a:t>
+              <a:t>2018. 09. 30.</a:t>
             </a:fld>
             <a:endParaRPr lang="hu-HU"/>
           </a:p>
@@ -2993,10 +2998,9 @@
           <a:lstStyle/>
           <a:p>
             <a:r>
-              <a:rPr lang="hu-HU" dirty="0" smtClean="0"/>
+              <a:rPr lang="hu-HU" dirty="0"/>
               <a:t>Programozók világa</a:t>
             </a:r>
-            <a:endParaRPr lang="hu-HU" dirty="0"/>
           </a:p>
         </p:txBody>
       </p:sp>
@@ -3027,7 +3031,7 @@
               <a:buChar char="•"/>
             </a:pPr>
             <a:r>
-              <a:rPr lang="hu-HU" dirty="0" smtClean="0"/>
+              <a:rPr lang="hu-HU" dirty="0"/>
               <a:t>Érdemes-e a programozói pályát választani?</a:t>
             </a:r>
           </a:p>
@@ -3037,7 +3041,7 @@
               <a:buChar char="•"/>
             </a:pPr>
             <a:r>
-              <a:rPr lang="hu-HU" dirty="0" smtClean="0"/>
+              <a:rPr lang="hu-HU" dirty="0"/>
               <a:t>Érdemes-e egyetemre járni a szakma megtanulásához?</a:t>
             </a:r>
           </a:p>
@@ -3047,7 +3051,7 @@
               <a:buChar char="•"/>
             </a:pPr>
             <a:r>
-              <a:rPr lang="hu-HU" dirty="0" smtClean="0"/>
+              <a:rPr lang="hu-HU" dirty="0"/>
               <a:t>Milyen lehetőségekkel, döntésekkel szembesültem az egyetem alatt?</a:t>
             </a:r>
           </a:p>
@@ -3057,7 +3061,7 @@
               <a:buChar char="•"/>
             </a:pPr>
             <a:r>
-              <a:rPr lang="hu-HU" dirty="0" smtClean="0"/>
+              <a:rPr lang="hu-HU" dirty="0"/>
               <a:t>Milyen az ipari, milyen az akadémiai élet?</a:t>
             </a:r>
           </a:p>
@@ -3110,10 +3114,9 @@
           <a:p>
             <a:pPr algn="ctr"/>
             <a:r>
-              <a:rPr lang="hu-HU" dirty="0" smtClean="0"/>
+              <a:rPr lang="hu-HU" dirty="0"/>
               <a:t>Magamról</a:t>
             </a:r>
-            <a:endParaRPr lang="hu-HU" dirty="0"/>
           </a:p>
         </p:txBody>
       </p:sp>
@@ -3138,59 +3141,69 @@
           <a:lstStyle/>
           <a:p>
             <a:r>
-              <a:rPr lang="hu-HU" sz="3200" dirty="0" smtClean="0"/>
+              <a:rPr lang="hu-HU" sz="3200" dirty="0"/>
               <a:t>Hol tartok jelenleg?</a:t>
             </a:r>
           </a:p>
           <a:p>
             <a:pPr lvl="1"/>
             <a:r>
-              <a:rPr lang="hu-HU" sz="2800" dirty="0" smtClean="0"/>
+              <a:rPr lang="hu-HU" sz="2800" dirty="0"/>
               <a:t>ELTE IK – MSc utolsó félév (diplamunka, záróvizsga)</a:t>
             </a:r>
           </a:p>
           <a:p>
             <a:pPr lvl="1"/>
             <a:r>
-              <a:rPr lang="hu-HU" sz="2800" dirty="0" smtClean="0"/>
+              <a:rPr lang="hu-HU" sz="2800" dirty="0"/>
               <a:t>Projektmunka az egyetemen (akadémiai tapasztalatok)</a:t>
             </a:r>
           </a:p>
           <a:p>
             <a:pPr lvl="1"/>
             <a:r>
-              <a:rPr lang="hu-HU" sz="2800" dirty="0" smtClean="0"/>
+              <a:rPr lang="hu-HU" sz="2800" dirty="0"/>
               <a:t>Gyakorlatok vezetése az egyetemen (oktatói tapasztalatok)</a:t>
             </a:r>
-            <a:endParaRPr lang="hu-HU" sz="2800" dirty="0" smtClean="0"/>
           </a:p>
           <a:p>
             <a:pPr lvl="1"/>
             <a:r>
-              <a:rPr lang="hu-HU" sz="2800" dirty="0" smtClean="0"/>
+              <a:rPr lang="hu-HU" sz="2800" dirty="0"/>
               <a:t>Graphisoft gyakornoka (ipari tapasztaltok)</a:t>
             </a:r>
           </a:p>
           <a:p>
             <a:r>
-              <a:rPr lang="hu-HU" sz="3200" dirty="0" smtClean="0"/>
+              <a:rPr lang="hu-HU" sz="3200" dirty="0"/>
               <a:t>Honnan indultam?</a:t>
             </a:r>
           </a:p>
           <a:p>
             <a:pPr lvl="1"/>
             <a:r>
-              <a:rPr lang="hu-HU" sz="2800" dirty="0" smtClean="0"/>
+              <a:rPr lang="hu-HU" sz="2800" dirty="0"/>
               <a:t>Gimnázium, humán (magyar-töri) tagozat..</a:t>
             </a:r>
           </a:p>
           <a:p>
             <a:pPr lvl="1"/>
             <a:r>
-              <a:rPr lang="hu-HU" sz="2800" dirty="0" smtClean="0"/>
+              <a:rPr lang="hu-HU" sz="2800" dirty="0"/>
               <a:t>Fél év alatt felkészülés az emelt infóra.. (Lehetséges!)</a:t>
             </a:r>
-            <a:endParaRPr lang="hu-HU" sz="3200" dirty="0" smtClean="0"/>
+          </a:p>
+          <a:p>
+            <a:pPr lvl="1"/>
+            <a:r>
+              <a:rPr lang="hu-HU" sz="2800" dirty="0"/>
+              <a:t>(Magántanárral a legkönnyebb, én is </a:t>
+            </a:r>
+            <a:r>
+              <a:rPr lang="hu-HU" sz="2800"/>
+              <a:t>vállalok diákokat..)</a:t>
+            </a:r>
+            <a:endParaRPr lang="hu-HU" sz="3200" dirty="0"/>
           </a:p>
           <a:p>
             <a:endParaRPr lang="hu-HU" dirty="0"/>
@@ -3242,11 +3255,11 @@
           <a:bodyPr/>
           <a:lstStyle/>
           <a:p>
-            <a:r>
-              <a:rPr lang="hu-HU" dirty="0" smtClean="0"/>
+            <a:pPr algn="ctr"/>
+            <a:r>
+              <a:rPr lang="hu-HU" dirty="0"/>
               <a:t>Miért választottam a programozói pályát?</a:t>
             </a:r>
-            <a:endParaRPr lang="hu-HU" dirty="0"/>
           </a:p>
         </p:txBody>
       </p:sp>
@@ -3271,26 +3284,25 @@
           <a:lstStyle/>
           <a:p>
             <a:r>
-              <a:rPr lang="hu-HU" dirty="0" smtClean="0"/>
+              <a:rPr lang="hu-HU" dirty="0"/>
               <a:t>Megszerettem a matekot</a:t>
             </a:r>
           </a:p>
           <a:p>
             <a:r>
-              <a:rPr lang="hu-HU" dirty="0" smtClean="0"/>
+              <a:rPr lang="hu-HU" dirty="0"/>
               <a:t>Mérnöki pályát szerettem volna</a:t>
             </a:r>
-            <a:endParaRPr lang="hu-HU" dirty="0" smtClean="0"/>
-          </a:p>
-          <a:p>
-            <a:r>
-              <a:rPr lang="hu-HU" dirty="0" smtClean="0"/>
+          </a:p>
+          <a:p>
+            <a:r>
+              <a:rPr lang="hu-HU" dirty="0"/>
               <a:t>Érdekelt a programozás, és láttam magamban kompetenciát rá</a:t>
             </a:r>
           </a:p>
           <a:p>
             <a:r>
-              <a:rPr lang="hu-HU" dirty="0" smtClean="0"/>
+              <a:rPr lang="hu-HU" dirty="0"/>
               <a:t>A pénz csak az utolsó szempont volt..</a:t>
             </a:r>
           </a:p>
@@ -3343,10 +3355,9 @@
           <a:p>
             <a:pPr algn="ctr"/>
             <a:r>
-              <a:rPr lang="hu-HU" dirty="0" smtClean="0"/>
+              <a:rPr lang="hu-HU" dirty="0"/>
               <a:t>Menjünk-e egyetemre?</a:t>
             </a:r>
-            <a:endParaRPr lang="hu-HU" dirty="0"/>
           </a:p>
         </p:txBody>
       </p:sp>
@@ -3360,95 +3371,98 @@
             <p:ph idx="1"/>
           </p:nvPr>
         </p:nvSpPr>
-        <p:spPr/>
+        <p:spPr>
+          <a:xfrm>
+            <a:off x="838200" y="1825625"/>
+            <a:ext cx="10515600" cy="4667250"/>
+          </a:xfrm>
+        </p:spPr>
         <p:txBody>
           <a:bodyPr>
-            <a:normAutofit fontScale="92500" lnSpcReduction="20000"/>
+            <a:normAutofit fontScale="92500" lnSpcReduction="10000"/>
           </a:bodyPr>
           <a:lstStyle/>
           <a:p>
             <a:r>
-              <a:rPr lang="hu-HU" dirty="0" smtClean="0"/>
+              <a:rPr lang="hu-HU" dirty="0"/>
               <a:t>Pro</a:t>
             </a:r>
           </a:p>
           <a:p>
             <a:pPr lvl="1"/>
             <a:r>
-              <a:rPr lang="hu-HU" dirty="0" smtClean="0"/>
+              <a:rPr lang="hu-HU" dirty="0"/>
               <a:t>A szakmán kívűl általános ismerteket is ad (jog, közgazdaság)</a:t>
             </a:r>
           </a:p>
           <a:p>
             <a:pPr lvl="1"/>
             <a:r>
-              <a:rPr lang="hu-HU" dirty="0" smtClean="0"/>
+              <a:rPr lang="hu-HU" dirty="0"/>
               <a:t>Kialakul egy erős matemtikai szemlélet</a:t>
             </a:r>
           </a:p>
           <a:p>
             <a:pPr lvl="1"/>
             <a:r>
-              <a:rPr lang="hu-HU" dirty="0" smtClean="0"/>
+              <a:rPr lang="hu-HU" dirty="0"/>
               <a:t>Lehetőség a kutatómunkára, oktatásra</a:t>
             </a:r>
           </a:p>
           <a:p>
             <a:pPr lvl="1"/>
             <a:r>
-              <a:rPr lang="hu-HU" dirty="0" smtClean="0"/>
+              <a:rPr lang="hu-HU" dirty="0"/>
               <a:t>Egy mérnöki/természettudományos diplmát értékelnek a cégek (nem csak a programozócégek)</a:t>
             </a:r>
           </a:p>
           <a:p>
             <a:pPr lvl="1"/>
             <a:r>
-              <a:rPr lang="hu-HU" dirty="0" smtClean="0"/>
+              <a:rPr lang="hu-HU" dirty="0"/>
               <a:t>Kilépés a komfortzónából</a:t>
             </a:r>
-            <a:endParaRPr lang="hu-HU" dirty="0" smtClean="0"/>
           </a:p>
           <a:p>
             <a:pPr lvl="1"/>
             <a:r>
-              <a:rPr lang="hu-HU" dirty="0" smtClean="0"/>
+              <a:rPr lang="hu-HU" dirty="0"/>
               <a:t>Nincs haszontalan tudás: Van miről elmélkedni kocsmázás közben</a:t>
             </a:r>
           </a:p>
           <a:p>
             <a:r>
-              <a:rPr lang="hu-HU" dirty="0" smtClean="0"/>
+              <a:rPr lang="hu-HU" dirty="0"/>
               <a:t>Kontra</a:t>
             </a:r>
           </a:p>
           <a:p>
             <a:pPr lvl="1"/>
             <a:r>
-              <a:rPr lang="hu-HU" dirty="0" smtClean="0"/>
+              <a:rPr lang="hu-HU" dirty="0"/>
               <a:t>A matekos rész helyeként sok, túl elméleti</a:t>
             </a:r>
           </a:p>
           <a:p>
             <a:pPr lvl="1"/>
             <a:r>
-              <a:rPr lang="hu-HU" dirty="0" smtClean="0"/>
+              <a:rPr lang="hu-HU" dirty="0"/>
               <a:t>Eleve sokan kibuknak a matekon, mert másra számítanak</a:t>
             </a:r>
           </a:p>
           <a:p>
             <a:pPr lvl="1"/>
             <a:r>
-              <a:rPr lang="hu-HU" dirty="0" smtClean="0"/>
+              <a:rPr lang="hu-HU" dirty="0"/>
               <a:t>Sok önálló munkát igényel a szakma elsajátítása (ami részben jó is)</a:t>
             </a:r>
           </a:p>
           <a:p>
             <a:pPr lvl="1"/>
             <a:r>
-              <a:rPr lang="hu-HU" dirty="0" smtClean="0"/>
+              <a:rPr lang="hu-HU" dirty="0"/>
               <a:t>Néha a kreativitás rovására erőltetnek egy szemléletet</a:t>
             </a:r>
-            <a:endParaRPr lang="hu-HU" dirty="0"/>
           </a:p>
         </p:txBody>
       </p:sp>
@@ -3499,10 +3513,9 @@
           <a:p>
             <a:pPr algn="ctr"/>
             <a:r>
-              <a:rPr lang="hu-HU" dirty="0" smtClean="0"/>
+              <a:rPr lang="hu-HU" dirty="0"/>
               <a:t>Milyen lehetőségek vannak még a programozó egyeten kívűl?</a:t>
             </a:r>
-            <a:endParaRPr lang="hu-HU" dirty="0"/>
           </a:p>
         </p:txBody>
       </p:sp>
@@ -3524,40 +3537,39 @@
           <a:lstStyle/>
           <a:p>
             <a:r>
-              <a:rPr lang="hu-HU" dirty="0" smtClean="0"/>
+              <a:rPr lang="hu-HU" dirty="0"/>
               <a:t>OKJ (nem javaslom, annak sem, aki nem akar matekot)</a:t>
             </a:r>
           </a:p>
           <a:p>
             <a:r>
-              <a:rPr lang="hu-HU" dirty="0" smtClean="0"/>
+              <a:rPr lang="hu-HU" dirty="0"/>
               <a:t>Felősoktatási szakképzés (BGE-n van pl)</a:t>
             </a:r>
           </a:p>
           <a:p>
             <a:r>
-              <a:rPr lang="hu-HU" dirty="0" smtClean="0"/>
+              <a:rPr lang="hu-HU" dirty="0"/>
               <a:t>Cégek által hírdetett képzések, magániskolák.. (nincs releváns tapasztaltom)</a:t>
             </a:r>
           </a:p>
           <a:p>
             <a:r>
-              <a:rPr lang="hu-HU" dirty="0" smtClean="0"/>
-              <a:t>Igazából bármilyen természettudományos vagy mérnöki végzettség megteszi.. (pl. gépészmérnök, fizikus, matematikus, matektanár, vegyész, stb..)</a:t>
-            </a:r>
-          </a:p>
-          <a:p>
-            <a:r>
-              <a:rPr lang="hu-HU" dirty="0" smtClean="0"/>
+              <a:rPr lang="hu-HU" dirty="0"/>
+              <a:t>Igazából bármilyen természettudományos vagy mérnöki végzettség megteszi.. (pl. villamosmérnök, gépészmérnök, fizikus, matematikus, matektanár, vegyész, stb..)</a:t>
+            </a:r>
+          </a:p>
+          <a:p>
+            <a:r>
+              <a:rPr lang="hu-HU" dirty="0"/>
               <a:t>Fontos, hogy ne erőltessük se a szakmát se az egyetemet, ha nem érezzük az affinitást magunkban.. (személyes tapasztalatok..)</a:t>
             </a:r>
           </a:p>
           <a:p>
             <a:r>
-              <a:rPr lang="hu-HU" dirty="0" smtClean="0"/>
+              <a:rPr lang="hu-HU" dirty="0"/>
               <a:t>Fél évig lehet meggondolni magad</a:t>
             </a:r>
-            <a:endParaRPr lang="hu-HU" dirty="0"/>
           </a:p>
         </p:txBody>
       </p:sp>
@@ -3608,10 +3620,9 @@
           <a:p>
             <a:pPr algn="ctr"/>
             <a:r>
-              <a:rPr lang="hu-HU" dirty="0" smtClean="0"/>
+              <a:rPr lang="hu-HU" dirty="0"/>
               <a:t>Tantervi refom az ELTE-n</a:t>
             </a:r>
-            <a:endParaRPr lang="hu-HU" dirty="0"/>
           </a:p>
         </p:txBody>
       </p:sp>
@@ -3636,44 +3647,43 @@
           <a:lstStyle/>
           <a:p>
             <a:r>
-              <a:rPr lang="hu-HU" dirty="0" smtClean="0"/>
+              <a:rPr lang="hu-HU" dirty="0"/>
               <a:t>Régi tanrendeben tanultam, de része voltam az egyik programozó tárgy tannyagfejlesztésének és oktatásának</a:t>
             </a:r>
           </a:p>
           <a:p>
             <a:r>
-              <a:rPr lang="hu-HU" dirty="0" smtClean="0"/>
+              <a:rPr lang="hu-HU" dirty="0"/>
               <a:t>Fontosabb változások:</a:t>
             </a:r>
           </a:p>
           <a:p>
             <a:pPr lvl="1"/>
             <a:r>
-              <a:rPr lang="hu-HU" dirty="0" smtClean="0"/>
-              <a:t>Jobban elkülönül a három szakirány</a:t>
+              <a:rPr lang="hu-HU" dirty="0"/>
+              <a:t>Jobban elkülönül a három szakirány (szoftverfejlesztői, alkalmazói, modellezői)</a:t>
             </a:r>
           </a:p>
           <a:p>
             <a:pPr lvl="1"/>
             <a:r>
-              <a:rPr lang="hu-HU" dirty="0" smtClean="0"/>
+              <a:rPr lang="hu-HU" dirty="0"/>
               <a:t>Kevesebb matek a nem-matekos szakirányokon (kevesebb elméleti analízis)</a:t>
             </a:r>
           </a:p>
           <a:p>
             <a:pPr lvl="1"/>
             <a:r>
-              <a:rPr lang="hu-HU" dirty="0" smtClean="0"/>
+              <a:rPr lang="hu-HU" dirty="0"/>
               <a:t>Első félévben inkább szakmai tárgyak vannak (sok nyelv: C, Phyton, funkcionális nyelv, script nyelvek), kevés matek</a:t>
             </a:r>
           </a:p>
           <a:p>
             <a:pPr lvl="1"/>
             <a:r>
-              <a:rPr lang="hu-HU" dirty="0" smtClean="0"/>
+              <a:rPr lang="hu-HU" dirty="0"/>
               <a:t>Egy fokkal gyakorlatiasabb képzés felé mozdult el az egyetem</a:t>
             </a:r>
-            <a:endParaRPr lang="hu-HU" dirty="0"/>
           </a:p>
         </p:txBody>
       </p:sp>
@@ -3723,10 +3733,9 @@
           <a:lstStyle/>
           <a:p>
             <a:r>
-              <a:rPr lang="hu-HU" dirty="0" smtClean="0"/>
+              <a:rPr lang="hu-HU" dirty="0"/>
               <a:t>Milyen lehetőségeid vannak az egyetemen?</a:t>
             </a:r>
-            <a:endParaRPr lang="hu-HU" dirty="0"/>
           </a:p>
         </p:txBody>
       </p:sp>
@@ -3753,55 +3762,54 @@
           <a:lstStyle/>
           <a:p>
             <a:r>
-              <a:rPr lang="hu-HU" dirty="0" smtClean="0"/>
+              <a:rPr lang="hu-HU" dirty="0"/>
               <a:t>Alapkzés eleje: Minél többet megpróbálasz fejlődni szakmailag a tárgyakon, valamint otthon</a:t>
             </a:r>
           </a:p>
           <a:p>
             <a:r>
-              <a:rPr lang="hu-HU" dirty="0" smtClean="0"/>
+              <a:rPr lang="hu-HU" dirty="0"/>
               <a:t>Alapkézés vége: Több lehetőség</a:t>
             </a:r>
           </a:p>
           <a:p>
             <a:pPr lvl="1"/>
             <a:r>
-              <a:rPr lang="hu-HU" dirty="0" smtClean="0"/>
+              <a:rPr lang="hu-HU" dirty="0"/>
               <a:t>Bekerülhetsz projektmunkákba, akár pénzt is kaphatsz érte, a szakdogozatodat és a szakmai gyakorlatod is letduhatod ennek keretében</a:t>
             </a:r>
           </a:p>
           <a:p>
             <a:pPr lvl="1"/>
             <a:r>
-              <a:rPr lang="hu-HU" dirty="0" smtClean="0"/>
-              <a:t>Elmozdulsz az ipar felé, szakmai gyakorlat révén, ilyenkor a szakdolgozatod valószínűleg függettlen lesz a munkádtól</a:t>
-            </a:r>
-            <a:endParaRPr lang="hu-HU" dirty="0"/>
-          </a:p>
-          <a:p>
-            <a:r>
-              <a:rPr lang="hu-HU" dirty="0" smtClean="0"/>
+              <a:rPr lang="hu-HU" dirty="0"/>
+              <a:t>Elmozdulsz az ipar felé, szakmai gyakorlat révén, ilyenkor a szakdolgozatod valószínűleg függettlen lesz a munkádtól (cégfüggő..)</a:t>
+            </a:r>
+          </a:p>
+          <a:p>
+            <a:r>
+              <a:rPr lang="hu-HU" dirty="0"/>
               <a:t>Mesterképzés eleje:</a:t>
             </a:r>
           </a:p>
           <a:p>
             <a:pPr lvl="1"/>
             <a:r>
-              <a:rPr lang="hu-HU" dirty="0" smtClean="0"/>
+              <a:rPr lang="hu-HU" dirty="0"/>
               <a:t>El sem kezded, elmész dolgozni, alapkézéssel már megfelelő szakismerted lesz valószínűleg hozzá</a:t>
             </a:r>
           </a:p>
           <a:p>
             <a:pPr lvl="1"/>
             <a:r>
-              <a:rPr lang="hu-HU" dirty="0" smtClean="0"/>
+              <a:rPr lang="hu-HU" dirty="0"/>
               <a:t>Elkezded, és mellette diákmunkásként dolgozol (én ezt csináltam..)</a:t>
             </a:r>
           </a:p>
           <a:p>
             <a:pPr lvl="1"/>
             <a:r>
-              <a:rPr lang="hu-HU" dirty="0" smtClean="0"/>
+              <a:rPr lang="hu-HU" dirty="0"/>
               <a:t>Továbbá a projektmunkát is folytathatod, valamint gyakorlatvezetéseket is vállalhatsz</a:t>
             </a:r>
           </a:p>
@@ -3859,10 +3867,9 @@
           <a:p>
             <a:pPr algn="ctr"/>
             <a:r>
-              <a:rPr lang="hu-HU" dirty="0" smtClean="0"/>
+              <a:rPr lang="hu-HU" dirty="0"/>
               <a:t>Egyetemi karrier hosszabb távon</a:t>
             </a:r>
-            <a:endParaRPr lang="hu-HU" dirty="0"/>
           </a:p>
         </p:txBody>
       </p:sp>
@@ -3889,72 +3896,63 @@
           <a:lstStyle/>
           <a:p>
             <a:r>
-              <a:rPr lang="hu-HU" dirty="0" smtClean="0"/>
+              <a:rPr lang="hu-HU" dirty="0"/>
               <a:t>Ha elég elkötelezett vagy..</a:t>
             </a:r>
           </a:p>
           <a:p>
             <a:r>
-              <a:rPr lang="hu-HU" dirty="0" smtClean="0"/>
+              <a:rPr lang="hu-HU" dirty="0"/>
               <a:t>Dönthetsz úgy, hogy az ipar helyett az egyetemen folytatod a munkád</a:t>
             </a:r>
           </a:p>
           <a:p>
             <a:r>
-              <a:rPr lang="hu-HU" dirty="0" smtClean="0"/>
+              <a:rPr lang="hu-HU" dirty="0"/>
               <a:t>Doktori öszöndíj, pályázatok, órák tartása – elfogadható jövedelem</a:t>
             </a:r>
           </a:p>
           <a:p>
             <a:r>
-              <a:rPr lang="hu-HU" dirty="0" smtClean="0"/>
-              <a:t>Publikációk írása, doktori munka megírása, megvédése</a:t>
-            </a:r>
-          </a:p>
-          <a:p>
-            <a:r>
-              <a:rPr lang="hu-HU" dirty="0" smtClean="0"/>
+              <a:rPr lang="hu-HU" dirty="0"/>
+              <a:t>Publikációk írása, doktori munka megírása, megvédése, tárgyak is vannak..</a:t>
+            </a:r>
+          </a:p>
+          <a:p>
+            <a:r>
+              <a:rPr lang="hu-HU" dirty="0"/>
               <a:t>Rugalmas időbeosztás (annyit dolgozol, amit vállalsz)</a:t>
             </a:r>
           </a:p>
           <a:p>
             <a:r>
-              <a:rPr lang="hu-HU" dirty="0" smtClean="0"/>
+              <a:rPr lang="hu-HU" dirty="0"/>
               <a:t>Bizonytalanabb jövedelemforrás, sok felé szakadsz, könnyen túlvállalod magad</a:t>
             </a:r>
           </a:p>
           <a:p>
             <a:r>
-              <a:rPr lang="hu-HU" dirty="0" smtClean="0"/>
-              <a:t>Egyénibb munka, kissebb csataokban dolgozol csak</a:t>
-            </a:r>
-          </a:p>
-          <a:p>
-            <a:r>
-              <a:rPr lang="hu-HU" dirty="0" smtClean="0"/>
-              <a:t>A szakmát fejeszted, nem egy konkrét alklmazást (pl. </a:t>
-            </a:r>
-            <a:r>
-              <a:rPr lang="hu-HU" dirty="0"/>
-              <a:t>e</a:t>
-            </a:r>
-            <a:r>
-              <a:rPr lang="hu-HU" dirty="0" smtClean="0"/>
-              <a:t>gy programozási nyelvet..)</a:t>
-            </a:r>
-          </a:p>
-          <a:p>
-            <a:r>
-              <a:rPr lang="hu-HU" dirty="0" smtClean="0"/>
+              <a:rPr lang="hu-HU" dirty="0"/>
+              <a:t>Egyénibb munka, kisebb csapatokban dolgozol csak</a:t>
+            </a:r>
+          </a:p>
+          <a:p>
+            <a:r>
+              <a:rPr lang="hu-HU" dirty="0"/>
+              <a:t>A szakmát fejeszted, nem egy konkrét alklmazást (pl. egy programozási nyelvet..)</a:t>
+            </a:r>
+          </a:p>
+          <a:p>
+            <a:r>
+              <a:rPr lang="hu-HU" dirty="0"/>
               <a:t>Az ötleteidet valósíthatod meg, és általában nem egy ügyfél kivánságát</a:t>
             </a:r>
           </a:p>
           <a:p>
             <a:r>
-              <a:rPr lang="hu-HU" dirty="0" smtClean="0"/>
+              <a:rPr lang="hu-HU" dirty="0"/>
               <a:t>Innovatívabb</a:t>
             </a:r>
-            <a:endParaRPr lang="hu-HU" dirty="0"/>
           </a:p>
         </p:txBody>
       </p:sp>
@@ -4012,10 +4010,9 @@
           <a:p>
             <a:pPr algn="ctr"/>
             <a:r>
-              <a:rPr lang="hu-HU" dirty="0" smtClean="0"/>
+              <a:rPr lang="hu-HU" dirty="0"/>
               <a:t>Ipari munka</a:t>
             </a:r>
-            <a:endParaRPr lang="hu-HU" dirty="0"/>
           </a:p>
         </p:txBody>
       </p:sp>
@@ -4042,76 +4039,75 @@
           <a:lstStyle/>
           <a:p>
             <a:r>
-              <a:rPr lang="hu-HU" dirty="0" smtClean="0"/>
+              <a:rPr lang="hu-HU" dirty="0"/>
               <a:t>Magas alapjövedelem</a:t>
             </a:r>
           </a:p>
           <a:p>
             <a:r>
-              <a:rPr lang="hu-HU" dirty="0" smtClean="0"/>
-              <a:t>8 óra munka, 8 óra pihenés..</a:t>
-            </a:r>
-          </a:p>
-          <a:p>
-            <a:r>
-              <a:rPr lang="hu-HU" dirty="0" smtClean="0"/>
+              <a:rPr lang="hu-HU" dirty="0"/>
+              <a:t>8 óra munka, 8 óra pihenés.. (de ez is cégfüggő)</a:t>
+            </a:r>
+          </a:p>
+          <a:p>
+            <a:r>
+              <a:rPr lang="hu-HU" dirty="0"/>
               <a:t>Kódok írása</a:t>
             </a:r>
           </a:p>
           <a:p>
             <a:r>
-              <a:rPr lang="hu-HU" dirty="0" smtClean="0"/>
-              <a:t>Hatalmas kódbázisok értelmezése, felfogratása</a:t>
-            </a:r>
-          </a:p>
-          <a:p>
-            <a:r>
-              <a:rPr lang="hu-HU" dirty="0" smtClean="0"/>
+              <a:rPr lang="hu-HU" dirty="0"/>
+              <a:t>Hatalmas kódbázisok értelmezése, felforgatása</a:t>
+            </a:r>
+          </a:p>
+          <a:p>
+            <a:r>
+              <a:rPr lang="hu-HU" dirty="0"/>
               <a:t>Csapatmunka, feladatok szétválasztása, meetingek..</a:t>
             </a:r>
           </a:p>
           <a:p>
             <a:r>
-              <a:rPr lang="hu-HU" dirty="0" smtClean="0"/>
+              <a:rPr lang="hu-HU" dirty="0"/>
               <a:t>Szorosabb határidők</a:t>
             </a:r>
           </a:p>
           <a:p>
             <a:r>
-              <a:rPr lang="hu-HU" dirty="0" smtClean="0"/>
-              <a:t>Figyelni a kód tisztasága (jól érthetőségére)</a:t>
-            </a:r>
-          </a:p>
-          <a:p>
-            <a:r>
-              <a:rPr lang="hu-HU" dirty="0" smtClean="0"/>
+              <a:rPr lang="hu-HU" dirty="0"/>
+              <a:t>Figyelni a kód tisztaságára (jól érthetőségére)</a:t>
+            </a:r>
+          </a:p>
+          <a:p>
+            <a:r>
+              <a:rPr lang="hu-HU" dirty="0"/>
               <a:t>Prcezínek kell lenni, hogy minél kevesebbet hibázzunk</a:t>
             </a:r>
           </a:p>
           <a:p>
             <a:r>
-              <a:rPr lang="hu-HU" dirty="0" smtClean="0"/>
+              <a:rPr lang="hu-HU" dirty="0"/>
               <a:t>Úgyis hibázunk, tesztelni kell folyamatosan régi fejlesztéseket is..</a:t>
             </a:r>
           </a:p>
           <a:p>
             <a:r>
-              <a:rPr lang="hu-HU" dirty="0" smtClean="0"/>
+              <a:rPr lang="hu-HU" dirty="0"/>
               <a:t>Az akadémia jobban az új dolgok létrehozásáról szól, az iparban nagy hangsúlyt kap a meglévő fejlesztések karbantartása..</a:t>
             </a:r>
           </a:p>
           <a:p>
             <a:r>
-              <a:rPr lang="hu-HU" dirty="0" smtClean="0"/>
+              <a:rPr lang="hu-HU" dirty="0"/>
               <a:t>Csapatok vezetése, ügyfelekkel való értetlenkedés..</a:t>
             </a:r>
           </a:p>
           <a:p>
             <a:r>
-              <a:rPr lang="hu-HU" dirty="0" smtClean="0"/>
-              <a:t>Kevésbé innovatív, bár nagyobb foglalkoznak kutatás/fejlesztéssel (Ericcson, Google, Microsoft, stb)</a:t>
-            </a:r>
-            <a:endParaRPr lang="hu-HU" dirty="0"/>
+              <a:rPr lang="hu-HU" dirty="0"/>
+              <a:t>Kevésbé innovatív, bár nagyobb cégek foglalkoznak kutatás/fejlesztéssel (Ericcson, Google, Microsoft, stb)</a:t>
+            </a:r>
           </a:p>
         </p:txBody>
       </p:sp>

</xml_diff>

<commit_message>
Add new desing to programozok vilaga
</commit_message>
<xml_diff>
--- a/efop/03/Programozók világa.pptx
+++ b/efop/03/Programozók világa.pptx
@@ -13,7 +13,8 @@
     <p:sldId id="261" r:id="rId7"/>
     <p:sldId id="262" r:id="rId8"/>
     <p:sldId id="263" r:id="rId9"/>
-    <p:sldId id="264" r:id="rId10"/>
+    <p:sldId id="265" r:id="rId10"/>
+    <p:sldId id="264" r:id="rId11"/>
   </p:sldIdLst>
   <p:sldSz cx="12192000" cy="6858000"/>
   <p:notesSz cx="6858000" cy="9144000"/>
@@ -251,7 +252,7 @@
           <a:p>
             <a:fld id="{20357631-FF36-4D82-B011-A26686633743}" type="datetimeFigureOut">
               <a:rPr lang="hu-HU" smtClean="0"/>
-              <a:t>2018. 09. 30.</a:t>
+              <a:t>2018.10.01.</a:t>
             </a:fld>
             <a:endParaRPr lang="hu-HU"/>
           </a:p>
@@ -421,7 +422,7 @@
           <a:p>
             <a:fld id="{20357631-FF36-4D82-B011-A26686633743}" type="datetimeFigureOut">
               <a:rPr lang="hu-HU" smtClean="0"/>
-              <a:t>2018. 09. 30.</a:t>
+              <a:t>2018.10.01.</a:t>
             </a:fld>
             <a:endParaRPr lang="hu-HU"/>
           </a:p>
@@ -601,7 +602,7 @@
           <a:p>
             <a:fld id="{20357631-FF36-4D82-B011-A26686633743}" type="datetimeFigureOut">
               <a:rPr lang="hu-HU" smtClean="0"/>
-              <a:t>2018. 09. 30.</a:t>
+              <a:t>2018.10.01.</a:t>
             </a:fld>
             <a:endParaRPr lang="hu-HU"/>
           </a:p>
@@ -771,7 +772,7 @@
           <a:p>
             <a:fld id="{20357631-FF36-4D82-B011-A26686633743}" type="datetimeFigureOut">
               <a:rPr lang="hu-HU" smtClean="0"/>
-              <a:t>2018. 09. 30.</a:t>
+              <a:t>2018.10.01.</a:t>
             </a:fld>
             <a:endParaRPr lang="hu-HU"/>
           </a:p>
@@ -1017,7 +1018,7 @@
           <a:p>
             <a:fld id="{20357631-FF36-4D82-B011-A26686633743}" type="datetimeFigureOut">
               <a:rPr lang="hu-HU" smtClean="0"/>
-              <a:t>2018. 09. 30.</a:t>
+              <a:t>2018.10.01.</a:t>
             </a:fld>
             <a:endParaRPr lang="hu-HU"/>
           </a:p>
@@ -1249,7 +1250,7 @@
           <a:p>
             <a:fld id="{20357631-FF36-4D82-B011-A26686633743}" type="datetimeFigureOut">
               <a:rPr lang="hu-HU" smtClean="0"/>
-              <a:t>2018. 09. 30.</a:t>
+              <a:t>2018.10.01.</a:t>
             </a:fld>
             <a:endParaRPr lang="hu-HU"/>
           </a:p>
@@ -1616,7 +1617,7 @@
           <a:p>
             <a:fld id="{20357631-FF36-4D82-B011-A26686633743}" type="datetimeFigureOut">
               <a:rPr lang="hu-HU" smtClean="0"/>
-              <a:t>2018. 09. 30.</a:t>
+              <a:t>2018.10.01.</a:t>
             </a:fld>
             <a:endParaRPr lang="hu-HU"/>
           </a:p>
@@ -1734,7 +1735,7 @@
           <a:p>
             <a:fld id="{20357631-FF36-4D82-B011-A26686633743}" type="datetimeFigureOut">
               <a:rPr lang="hu-HU" smtClean="0"/>
-              <a:t>2018. 09. 30.</a:t>
+              <a:t>2018.10.01.</a:t>
             </a:fld>
             <a:endParaRPr lang="hu-HU"/>
           </a:p>
@@ -1829,7 +1830,7 @@
           <a:p>
             <a:fld id="{20357631-FF36-4D82-B011-A26686633743}" type="datetimeFigureOut">
               <a:rPr lang="hu-HU" smtClean="0"/>
-              <a:t>2018. 09. 30.</a:t>
+              <a:t>2018.10.01.</a:t>
             </a:fld>
             <a:endParaRPr lang="hu-HU"/>
           </a:p>
@@ -2106,7 +2107,7 @@
           <a:p>
             <a:fld id="{20357631-FF36-4D82-B011-A26686633743}" type="datetimeFigureOut">
               <a:rPr lang="hu-HU" smtClean="0"/>
-              <a:t>2018. 09. 30.</a:t>
+              <a:t>2018.10.01.</a:t>
             </a:fld>
             <a:endParaRPr lang="hu-HU"/>
           </a:p>
@@ -2359,7 +2360,7 @@
           <a:p>
             <a:fld id="{20357631-FF36-4D82-B011-A26686633743}" type="datetimeFigureOut">
               <a:rPr lang="hu-HU" smtClean="0"/>
-              <a:t>2018. 09. 30.</a:t>
+              <a:t>2018.10.01.</a:t>
             </a:fld>
             <a:endParaRPr lang="hu-HU"/>
           </a:p>
@@ -2424,9 +2425,14 @@
 <p:sldMaster xmlns:a="http://schemas.openxmlformats.org/drawingml/2006/main" xmlns:r="http://schemas.openxmlformats.org/officeDocument/2006/relationships" xmlns:p="http://schemas.openxmlformats.org/presentationml/2006/main">
   <p:cSld>
     <p:bg>
-      <p:bgRef idx="1001">
-        <a:schemeClr val="bg1"/>
-      </p:bgRef>
+      <p:bgPr>
+        <a:solidFill>
+          <a:schemeClr val="bg2">
+            <a:alpha val="50000"/>
+          </a:schemeClr>
+        </a:solidFill>
+        <a:effectLst/>
+      </p:bgPr>
     </p:bg>
     <p:spTree>
       <p:nvGrpSpPr>
@@ -2572,7 +2578,7 @@
           <a:p>
             <a:fld id="{20357631-FF36-4D82-B011-A26686633743}" type="datetimeFigureOut">
               <a:rPr lang="hu-HU" smtClean="0"/>
-              <a:t>2018. 09. 30.</a:t>
+              <a:t>2018.10.01.</a:t>
             </a:fld>
             <a:endParaRPr lang="hu-HU"/>
           </a:p>
@@ -3022,7 +3028,7 @@
         </p:spPr>
         <p:txBody>
           <a:bodyPr>
-            <a:normAutofit lnSpcReduction="10000"/>
+            <a:noAutofit/>
           </a:bodyPr>
           <a:lstStyle/>
           <a:p>
@@ -3031,7 +3037,7 @@
               <a:buChar char="•"/>
             </a:pPr>
             <a:r>
-              <a:rPr lang="hu-HU" dirty="0"/>
+              <a:rPr lang="hu-HU" sz="3200" dirty="0" smtClean="0"/>
               <a:t>Érdemes-e a programozói pályát választani?</a:t>
             </a:r>
           </a:p>
@@ -3041,7 +3047,7 @@
               <a:buChar char="•"/>
             </a:pPr>
             <a:r>
-              <a:rPr lang="hu-HU" dirty="0"/>
+              <a:rPr lang="hu-HU" sz="3200" dirty="0" smtClean="0"/>
               <a:t>Érdemes-e egyetemre járni a szakma megtanulásához?</a:t>
             </a:r>
           </a:p>
@@ -3051,7 +3057,7 @@
               <a:buChar char="•"/>
             </a:pPr>
             <a:r>
-              <a:rPr lang="hu-HU" dirty="0"/>
+              <a:rPr lang="hu-HU" sz="3200" dirty="0" smtClean="0"/>
               <a:t>Milyen lehetőségekkel, döntésekkel szembesültem az egyetem alatt?</a:t>
             </a:r>
           </a:p>
@@ -3061,9 +3067,10 @@
               <a:buChar char="•"/>
             </a:pPr>
             <a:r>
-              <a:rPr lang="hu-HU" dirty="0"/>
+              <a:rPr lang="hu-HU" sz="3200" dirty="0" smtClean="0"/>
               <a:t>Milyen az ipari, milyen az akadémiai élet?</a:t>
             </a:r>
+            <a:endParaRPr lang="hu-HU" sz="3200" dirty="0"/>
           </a:p>
         </p:txBody>
       </p:sp>
@@ -3071,6 +3078,168 @@
     <p:extLst>
       <p:ext uri="{BB962C8B-B14F-4D97-AF65-F5344CB8AC3E}">
         <p14:creationId xmlns:p14="http://schemas.microsoft.com/office/powerpoint/2010/main" val="1005734595"/>
+      </p:ext>
+    </p:extLst>
+  </p:cSld>
+  <p:clrMapOvr>
+    <a:masterClrMapping/>
+  </p:clrMapOvr>
+  <p:timing>
+    <p:tnLst>
+      <p:par>
+        <p:cTn id="1" dur="indefinite" restart="never" nodeType="tmRoot"/>
+      </p:par>
+    </p:tnLst>
+  </p:timing>
+</p:sld>
+</file>
+
+<file path=ppt/slides/slide10.xml><?xml version="1.0" encoding="utf-8"?>
+<p:sld xmlns:a="http://schemas.openxmlformats.org/drawingml/2006/main" xmlns:r="http://schemas.openxmlformats.org/officeDocument/2006/relationships" xmlns:p="http://schemas.openxmlformats.org/presentationml/2006/main">
+  <p:cSld>
+    <p:spTree>
+      <p:nvGrpSpPr>
+        <p:cNvPr id="1" name=""/>
+        <p:cNvGrpSpPr/>
+        <p:nvPr/>
+      </p:nvGrpSpPr>
+      <p:grpSpPr>
+        <a:xfrm>
+          <a:off x="0" y="0"/>
+          <a:ext cx="0" cy="0"/>
+          <a:chOff x="0" y="0"/>
+          <a:chExt cx="0" cy="0"/>
+        </a:xfrm>
+      </p:grpSpPr>
+      <p:sp>
+        <p:nvSpPr>
+          <p:cNvPr id="2" name="Title 1"/>
+          <p:cNvSpPr>
+            <a:spLocks noGrp="1"/>
+          </p:cNvSpPr>
+          <p:nvPr>
+            <p:ph type="title"/>
+          </p:nvPr>
+        </p:nvSpPr>
+        <p:spPr>
+          <a:xfrm>
+            <a:off x="838200" y="365125"/>
+            <a:ext cx="10515600" cy="793974"/>
+          </a:xfrm>
+        </p:spPr>
+        <p:txBody>
+          <a:bodyPr>
+            <a:normAutofit/>
+          </a:bodyPr>
+          <a:lstStyle/>
+          <a:p>
+            <a:pPr algn="ctr"/>
+            <a:r>
+              <a:rPr lang="hu-HU" dirty="0"/>
+              <a:t>Ipari munka</a:t>
+            </a:r>
+          </a:p>
+        </p:txBody>
+      </p:sp>
+      <p:sp>
+        <p:nvSpPr>
+          <p:cNvPr id="3" name="Content Placeholder 2"/>
+          <p:cNvSpPr>
+            <a:spLocks noGrp="1"/>
+          </p:cNvSpPr>
+          <p:nvPr>
+            <p:ph idx="1"/>
+          </p:nvPr>
+        </p:nvSpPr>
+        <p:spPr>
+          <a:xfrm>
+            <a:off x="270456" y="1262130"/>
+            <a:ext cx="11797048" cy="5409126"/>
+          </a:xfrm>
+        </p:spPr>
+        <p:txBody>
+          <a:bodyPr>
+            <a:normAutofit fontScale="85000" lnSpcReduction="20000"/>
+          </a:bodyPr>
+          <a:lstStyle/>
+          <a:p>
+            <a:r>
+              <a:rPr lang="hu-HU" dirty="0"/>
+              <a:t>Magas alapjövedelem</a:t>
+            </a:r>
+          </a:p>
+          <a:p>
+            <a:r>
+              <a:rPr lang="hu-HU" dirty="0"/>
+              <a:t>8 óra munka, 8 óra pihenés.. (de ez is cégfüggő)</a:t>
+            </a:r>
+          </a:p>
+          <a:p>
+            <a:r>
+              <a:rPr lang="hu-HU" dirty="0"/>
+              <a:t>Kódok írása</a:t>
+            </a:r>
+          </a:p>
+          <a:p>
+            <a:r>
+              <a:rPr lang="hu-HU" dirty="0"/>
+              <a:t>Hatalmas kódbázisok értelmezése, felforgatása</a:t>
+            </a:r>
+          </a:p>
+          <a:p>
+            <a:r>
+              <a:rPr lang="hu-HU" dirty="0"/>
+              <a:t>Csapatmunka, feladatok szétválasztása, meetingek..</a:t>
+            </a:r>
+          </a:p>
+          <a:p>
+            <a:r>
+              <a:rPr lang="hu-HU" dirty="0"/>
+              <a:t>Szorosabb határidők</a:t>
+            </a:r>
+          </a:p>
+          <a:p>
+            <a:r>
+              <a:rPr lang="hu-HU" dirty="0"/>
+              <a:t>Figyelni a kód tisztaságára (jól érthetőségére)</a:t>
+            </a:r>
+          </a:p>
+          <a:p>
+            <a:r>
+              <a:rPr lang="hu-HU" dirty="0"/>
+              <a:t>Prcezínek kell lenni, hogy minél kevesebbet hibázzunk</a:t>
+            </a:r>
+          </a:p>
+          <a:p>
+            <a:r>
+              <a:rPr lang="hu-HU" dirty="0"/>
+              <a:t>Úgyis hibázunk, tesztelni kell folyamatosan régi fejlesztéseket is..</a:t>
+            </a:r>
+          </a:p>
+          <a:p>
+            <a:r>
+              <a:rPr lang="hu-HU" dirty="0"/>
+              <a:t>Az akadémia jobban az új dolgok létrehozásáról szól, az iparban nagy hangsúlyt kap a meglévő fejlesztések karbantartása..</a:t>
+            </a:r>
+          </a:p>
+          <a:p>
+            <a:r>
+              <a:rPr lang="hu-HU" dirty="0"/>
+              <a:t>Csapatok vezetése, ügyfelekkel való értetlenkedés..</a:t>
+            </a:r>
+          </a:p>
+          <a:p>
+            <a:r>
+              <a:rPr lang="hu-HU" dirty="0"/>
+              <a:t>Kevésbé innovatív, bár nagyobb cégek foglalkoznak kutatás/fejlesztéssel (Ericcson, Google, Microsoft, stb)</a:t>
+            </a:r>
+          </a:p>
+        </p:txBody>
+      </p:sp>
+    </p:spTree>
+    <p:extLst>
+      <p:ext uri="{BB962C8B-B14F-4D97-AF65-F5344CB8AC3E}">
+        <p14:creationId xmlns:p14="http://schemas.microsoft.com/office/powerpoint/2010/main" val="69987778"/>
       </p:ext>
     </p:extLst>
   </p:cSld>
@@ -3196,12 +3365,8 @@
           <a:p>
             <a:pPr lvl="1"/>
             <a:r>
-              <a:rPr lang="hu-HU" sz="2800" dirty="0"/>
-              <a:t>(Magántanárral a legkönnyebb, én is </a:t>
-            </a:r>
-            <a:r>
-              <a:rPr lang="hu-HU" sz="2800"/>
-              <a:t>vállalok diákokat..)</a:t>
+              <a:rPr lang="hu-HU" sz="2800" dirty="0" smtClean="0"/>
+              <a:t>(Magántanárral a legkönnyebb, én is vállalok diákokat..)</a:t>
             </a:r>
             <a:endParaRPr lang="hu-HU" sz="3200" dirty="0"/>
           </a:p>
@@ -3220,6 +3385,13 @@
   <p:clrMapOvr>
     <a:masterClrMapping/>
   </p:clrMapOvr>
+  <p:timing>
+    <p:tnLst>
+      <p:par>
+        <p:cTn id="1" dur="indefinite" restart="never" nodeType="tmRoot"/>
+      </p:par>
+    </p:tnLst>
+  </p:timing>
 </p:sld>
 </file>
 
@@ -3280,29 +3452,31 @@
           </a:xfrm>
         </p:spPr>
         <p:txBody>
-          <a:bodyPr/>
-          <a:lstStyle/>
-          <a:p>
-            <a:r>
-              <a:rPr lang="hu-HU" dirty="0"/>
+          <a:bodyPr>
+            <a:noAutofit/>
+          </a:bodyPr>
+          <a:lstStyle/>
+          <a:p>
+            <a:r>
+              <a:rPr lang="hu-HU" sz="3600" dirty="0"/>
               <a:t>Megszerettem a matekot</a:t>
             </a:r>
           </a:p>
           <a:p>
             <a:r>
-              <a:rPr lang="hu-HU" dirty="0"/>
+              <a:rPr lang="hu-HU" sz="3600" dirty="0"/>
               <a:t>Mérnöki pályát szerettem volna</a:t>
             </a:r>
           </a:p>
           <a:p>
             <a:r>
-              <a:rPr lang="hu-HU" dirty="0"/>
+              <a:rPr lang="hu-HU" sz="3600" dirty="0"/>
               <a:t>Érdekelt a programozás, és láttam magamban kompetenciát rá</a:t>
             </a:r>
           </a:p>
           <a:p>
             <a:r>
-              <a:rPr lang="hu-HU" dirty="0"/>
+              <a:rPr lang="hu-HU" sz="3600" dirty="0"/>
               <a:t>A pénz csak az utolsó szempont volt..</a:t>
             </a:r>
           </a:p>
@@ -3318,6 +3492,13 @@
   <p:clrMapOvr>
     <a:masterClrMapping/>
   </p:clrMapOvr>
+  <p:timing>
+    <p:tnLst>
+      <p:par>
+        <p:cTn id="1" dur="indefinite" restart="never" nodeType="tmRoot"/>
+      </p:par>
+    </p:tnLst>
+  </p:timing>
 </p:sld>
 </file>
 
@@ -3348,38 +3529,43 @@
             <p:ph type="title"/>
           </p:nvPr>
         </p:nvSpPr>
-        <p:spPr/>
-        <p:txBody>
-          <a:bodyPr/>
-          <a:lstStyle/>
-          <a:p>
-            <a:pPr algn="ctr"/>
-            <a:r>
-              <a:rPr lang="hu-HU" dirty="0"/>
-              <a:t>Menjünk-e egyetemre?</a:t>
-            </a:r>
-          </a:p>
-        </p:txBody>
-      </p:sp>
-      <p:sp>
-        <p:nvSpPr>
-          <p:cNvPr id="3" name="Content Placeholder 2"/>
-          <p:cNvSpPr>
-            <a:spLocks noGrp="1"/>
-          </p:cNvSpPr>
-          <p:nvPr>
-            <p:ph idx="1"/>
-          </p:nvPr>
-        </p:nvSpPr>
         <p:spPr>
           <a:xfrm>
-            <a:off x="838200" y="1825625"/>
+            <a:off x="838200" y="-274955"/>
+            <a:ext cx="10515600" cy="1325563"/>
+          </a:xfrm>
+        </p:spPr>
+        <p:txBody>
+          <a:bodyPr/>
+          <a:lstStyle/>
+          <a:p>
+            <a:pPr algn="ctr"/>
+            <a:r>
+              <a:rPr lang="hu-HU" dirty="0"/>
+              <a:t>Menjünk-e egyetemre?</a:t>
+            </a:r>
+          </a:p>
+        </p:txBody>
+      </p:sp>
+      <p:sp>
+        <p:nvSpPr>
+          <p:cNvPr id="3" name="Content Placeholder 2"/>
+          <p:cNvSpPr>
+            <a:spLocks noGrp="1"/>
+          </p:cNvSpPr>
+          <p:nvPr>
+            <p:ph idx="1"/>
+          </p:nvPr>
+        </p:nvSpPr>
+        <p:spPr>
+          <a:xfrm>
+            <a:off x="838200" y="850265"/>
             <a:ext cx="10515600" cy="4667250"/>
           </a:xfrm>
         </p:spPr>
         <p:txBody>
           <a:bodyPr>
-            <a:normAutofit fontScale="92500" lnSpcReduction="10000"/>
+            <a:noAutofit/>
           </a:bodyPr>
           <a:lstStyle/>
           <a:p>
@@ -3391,42 +3577,42 @@
           <a:p>
             <a:pPr lvl="1"/>
             <a:r>
-              <a:rPr lang="hu-HU" dirty="0"/>
+              <a:rPr lang="hu-HU" sz="2800" dirty="0"/>
               <a:t>A szakmán kívűl általános ismerteket is ad (jog, közgazdaság)</a:t>
             </a:r>
           </a:p>
           <a:p>
             <a:pPr lvl="1"/>
             <a:r>
-              <a:rPr lang="hu-HU" dirty="0"/>
+              <a:rPr lang="hu-HU" sz="2800" dirty="0"/>
               <a:t>Kialakul egy erős matemtikai szemlélet</a:t>
             </a:r>
           </a:p>
           <a:p>
             <a:pPr lvl="1"/>
             <a:r>
-              <a:rPr lang="hu-HU" dirty="0"/>
+              <a:rPr lang="hu-HU" sz="2800" dirty="0"/>
               <a:t>Lehetőség a kutatómunkára, oktatásra</a:t>
             </a:r>
           </a:p>
           <a:p>
             <a:pPr lvl="1"/>
             <a:r>
-              <a:rPr lang="hu-HU" dirty="0"/>
+              <a:rPr lang="hu-HU" sz="2800" dirty="0"/>
               <a:t>Egy mérnöki/természettudományos diplmát értékelnek a cégek (nem csak a programozócégek)</a:t>
             </a:r>
           </a:p>
           <a:p>
             <a:pPr lvl="1"/>
             <a:r>
-              <a:rPr lang="hu-HU" dirty="0"/>
+              <a:rPr lang="hu-HU" sz="2800" dirty="0"/>
               <a:t>Kilépés a komfortzónából</a:t>
             </a:r>
           </a:p>
           <a:p>
             <a:pPr lvl="1"/>
             <a:r>
-              <a:rPr lang="hu-HU" dirty="0"/>
+              <a:rPr lang="hu-HU" sz="2800" dirty="0"/>
               <a:t>Nincs haszontalan tudás: Van miről elmélkedni kocsmázás közben</a:t>
             </a:r>
           </a:p>
@@ -3439,28 +3625,33 @@
           <a:p>
             <a:pPr lvl="1"/>
             <a:r>
-              <a:rPr lang="hu-HU" dirty="0"/>
-              <a:t>A matekos rész helyeként sok, túl elméleti</a:t>
-            </a:r>
+              <a:rPr lang="hu-HU" sz="2800" dirty="0"/>
+              <a:t>A matekos rész helyeként sok, túl </a:t>
+            </a:r>
+            <a:r>
+              <a:rPr lang="hu-HU" sz="2800" dirty="0" smtClean="0"/>
+              <a:t>elméleti (de jól meg van alapozva..)</a:t>
+            </a:r>
+            <a:endParaRPr lang="hu-HU" sz="2800" dirty="0"/>
           </a:p>
           <a:p>
             <a:pPr lvl="1"/>
             <a:r>
-              <a:rPr lang="hu-HU" dirty="0"/>
+              <a:rPr lang="hu-HU" sz="2800" dirty="0"/>
               <a:t>Eleve sokan kibuknak a matekon, mert másra számítanak</a:t>
             </a:r>
           </a:p>
           <a:p>
             <a:pPr lvl="1"/>
             <a:r>
-              <a:rPr lang="hu-HU" dirty="0"/>
+              <a:rPr lang="hu-HU" sz="2800" dirty="0"/>
               <a:t>Sok önálló munkát igényel a szakma elsajátítása (ami részben jó is)</a:t>
             </a:r>
           </a:p>
           <a:p>
             <a:pPr lvl="1"/>
             <a:r>
-              <a:rPr lang="hu-HU" dirty="0"/>
+              <a:rPr lang="hu-HU" sz="2800" dirty="0"/>
               <a:t>Néha a kreativitás rovására erőltetnek egy szemléletet</a:t>
             </a:r>
           </a:p>
@@ -3996,125 +4187,143 @@
             <p:ph type="title"/>
           </p:nvPr>
         </p:nvSpPr>
+        <p:spPr/>
+        <p:txBody>
+          <a:bodyPr/>
+          <a:lstStyle/>
+          <a:p>
+            <a:pPr algn="ctr"/>
+            <a:r>
+              <a:rPr lang="hu-HU" dirty="0" smtClean="0"/>
+              <a:t>Programozói munka</a:t>
+            </a:r>
+            <a:endParaRPr lang="hu-HU" dirty="0"/>
+          </a:p>
+        </p:txBody>
+      </p:sp>
+      <p:pic>
+        <p:nvPicPr>
+          <p:cNvPr id="6" name="Content Placeholder 5"/>
+          <p:cNvPicPr>
+            <a:picLocks noGrp="1" noChangeAspect="1"/>
+          </p:cNvPicPr>
+          <p:nvPr>
+            <p:ph idx="1"/>
+          </p:nvPr>
+        </p:nvPicPr>
+        <p:blipFill>
+          <a:blip r:embed="rId2" cstate="print">
+            <a:extLst>
+              <a:ext uri="{28A0092B-C50C-407E-A947-70E740481C1C}">
+                <a14:useLocalDpi xmlns:a14="http://schemas.microsoft.com/office/drawing/2010/main" val="0"/>
+              </a:ext>
+            </a:extLst>
+          </a:blip>
+          <a:stretch>
+            <a:fillRect/>
+          </a:stretch>
+        </p:blipFill>
         <p:spPr>
           <a:xfrm>
-            <a:off x="838200" y="365125"/>
-            <a:ext cx="10515600" cy="793974"/>
+            <a:off x="423285" y="1800381"/>
+            <a:ext cx="5376501" cy="3066597"/>
           </a:xfrm>
         </p:spPr>
-        <p:txBody>
-          <a:bodyPr>
-            <a:normAutofit/>
-          </a:bodyPr>
-          <a:lstStyle/>
-          <a:p>
-            <a:pPr algn="ctr"/>
-            <a:r>
-              <a:rPr lang="hu-HU" dirty="0"/>
-              <a:t>Ipari munka</a:t>
-            </a:r>
-          </a:p>
-        </p:txBody>
-      </p:sp>
-      <p:sp>
-        <p:nvSpPr>
-          <p:cNvPr id="3" name="Content Placeholder 2"/>
-          <p:cNvSpPr>
-            <a:spLocks noGrp="1"/>
-          </p:cNvSpPr>
-          <p:nvPr>
-            <p:ph idx="1"/>
-          </p:nvPr>
-        </p:nvSpPr>
+      </p:pic>
+      <p:pic>
+        <p:nvPicPr>
+          <p:cNvPr id="7" name="Picture 6"/>
+          <p:cNvPicPr>
+            <a:picLocks noChangeAspect="1"/>
+          </p:cNvPicPr>
+          <p:nvPr/>
+        </p:nvPicPr>
+        <p:blipFill>
+          <a:blip r:embed="rId3" cstate="print">
+            <a:extLst>
+              <a:ext uri="{28A0092B-C50C-407E-A947-70E740481C1C}">
+                <a14:useLocalDpi xmlns:a14="http://schemas.microsoft.com/office/drawing/2010/main" val="0"/>
+              </a:ext>
+            </a:extLst>
+          </a:blip>
+          <a:stretch>
+            <a:fillRect/>
+          </a:stretch>
+        </p:blipFill>
         <p:spPr>
           <a:xfrm>
-            <a:off x="270456" y="1262130"/>
-            <a:ext cx="11797048" cy="5409126"/>
+            <a:off x="6385125" y="3101859"/>
+            <a:ext cx="5806875" cy="3269997"/>
           </a:xfrm>
+          <a:prstGeom prst="rect">
+            <a:avLst/>
+          </a:prstGeom>
         </p:spPr>
-        <p:txBody>
-          <a:bodyPr>
-            <a:normAutofit fontScale="85000" lnSpcReduction="20000"/>
+      </p:pic>
+      <p:sp>
+        <p:nvSpPr>
+          <p:cNvPr id="8" name="TextBox 7"/>
+          <p:cNvSpPr txBox="1"/>
+          <p:nvPr/>
+        </p:nvSpPr>
+        <p:spPr>
+          <a:xfrm>
+            <a:off x="423285" y="1229023"/>
+            <a:ext cx="2139611" cy="461665"/>
+          </a:xfrm>
+          <a:prstGeom prst="rect">
+            <a:avLst/>
+          </a:prstGeom>
+          <a:noFill/>
+        </p:spPr>
+        <p:txBody>
+          <a:bodyPr wrap="square" rtlCol="0">
+            <a:spAutoFit/>
           </a:bodyPr>
           <a:lstStyle/>
           <a:p>
             <a:r>
-              <a:rPr lang="hu-HU" dirty="0"/>
-              <a:t>Magas alapjövedelem</a:t>
-            </a:r>
-          </a:p>
-          <a:p>
-            <a:r>
-              <a:rPr lang="hu-HU" dirty="0"/>
-              <a:t>8 óra munka, 8 óra pihenés.. (de ez is cégfüggő)</a:t>
-            </a:r>
-          </a:p>
-          <a:p>
-            <a:r>
-              <a:rPr lang="hu-HU" dirty="0"/>
-              <a:t>Kódok írása</a:t>
-            </a:r>
-          </a:p>
-          <a:p>
-            <a:r>
-              <a:rPr lang="hu-HU" dirty="0"/>
-              <a:t>Hatalmas kódbázisok értelmezése, felforgatása</a:t>
-            </a:r>
-          </a:p>
-          <a:p>
-            <a:r>
-              <a:rPr lang="hu-HU" dirty="0"/>
-              <a:t>Csapatmunka, feladatok szétválasztása, meetingek..</a:t>
-            </a:r>
-          </a:p>
-          <a:p>
-            <a:r>
-              <a:rPr lang="hu-HU" dirty="0"/>
-              <a:t>Szorosabb határidők</a:t>
-            </a:r>
-          </a:p>
-          <a:p>
-            <a:r>
-              <a:rPr lang="hu-HU" dirty="0"/>
-              <a:t>Figyelni a kód tisztaságára (jól érthetőségére)</a:t>
-            </a:r>
-          </a:p>
-          <a:p>
-            <a:r>
-              <a:rPr lang="hu-HU" dirty="0"/>
-              <a:t>Prcezínek kell lenni, hogy minél kevesebbet hibázzunk</a:t>
-            </a:r>
-          </a:p>
-          <a:p>
-            <a:r>
-              <a:rPr lang="hu-HU" dirty="0"/>
-              <a:t>Úgyis hibázunk, tesztelni kell folyamatosan régi fejlesztéseket is..</a:t>
-            </a:r>
-          </a:p>
-          <a:p>
-            <a:r>
-              <a:rPr lang="hu-HU" dirty="0"/>
-              <a:t>Az akadémia jobban az új dolgok létrehozásáról szól, az iparban nagy hangsúlyt kap a meglévő fejlesztések karbantartása..</a:t>
-            </a:r>
-          </a:p>
-          <a:p>
-            <a:r>
-              <a:rPr lang="hu-HU" dirty="0"/>
-              <a:t>Csapatok vezetése, ügyfelekkel való értetlenkedés..</a:t>
-            </a:r>
-          </a:p>
-          <a:p>
-            <a:r>
-              <a:rPr lang="hu-HU" dirty="0"/>
-              <a:t>Kevésbé innovatív, bár nagyobb cégek foglalkoznak kutatás/fejlesztéssel (Ericcson, Google, Microsoft, stb)</a:t>
-            </a:r>
+              <a:rPr lang="hu-HU" sz="2400" dirty="0" smtClean="0"/>
+              <a:t>Elképzelés:</a:t>
+            </a:r>
+            <a:endParaRPr lang="hu-HU" sz="2400" dirty="0"/>
+          </a:p>
+        </p:txBody>
+      </p:sp>
+      <p:sp>
+        <p:nvSpPr>
+          <p:cNvPr id="9" name="TextBox 8"/>
+          <p:cNvSpPr txBox="1"/>
+          <p:nvPr/>
+        </p:nvSpPr>
+        <p:spPr>
+          <a:xfrm>
+            <a:off x="6385125" y="2465430"/>
+            <a:ext cx="2139611" cy="461665"/>
+          </a:xfrm>
+          <a:prstGeom prst="rect">
+            <a:avLst/>
+          </a:prstGeom>
+          <a:noFill/>
+        </p:spPr>
+        <p:txBody>
+          <a:bodyPr wrap="square" rtlCol="0">
+            <a:spAutoFit/>
+          </a:bodyPr>
+          <a:lstStyle/>
+          <a:p>
+            <a:r>
+              <a:rPr lang="hu-HU" sz="2400" dirty="0" smtClean="0"/>
+              <a:t>Valóság:</a:t>
+            </a:r>
+            <a:endParaRPr lang="hu-HU" sz="2400" dirty="0"/>
           </a:p>
         </p:txBody>
       </p:sp>
     </p:spTree>
     <p:extLst>
       <p:ext uri="{BB962C8B-B14F-4D97-AF65-F5344CB8AC3E}">
-        <p14:creationId xmlns:p14="http://schemas.microsoft.com/office/powerpoint/2010/main" val="69987778"/>
+        <p14:creationId xmlns:p14="http://schemas.microsoft.com/office/powerpoint/2010/main" val="850174985"/>
       </p:ext>
     </p:extLst>
   </p:cSld>

</xml_diff>

<commit_message>
Mimor fixes in prgramozok vilaga ea
</commit_message>
<xml_diff>
--- a/efop/03/Programozók világa.pptx
+++ b/efop/03/Programozók világa.pptx
@@ -15,6 +15,7 @@
     <p:sldId id="263" r:id="rId9"/>
     <p:sldId id="265" r:id="rId10"/>
     <p:sldId id="264" r:id="rId11"/>
+    <p:sldId id="266" r:id="rId12"/>
   </p:sldIdLst>
   <p:sldSz cx="12192000" cy="6858000"/>
   <p:notesSz cx="6858000" cy="9144000"/>
@@ -252,7 +253,7 @@
           <a:p>
             <a:fld id="{20357631-FF36-4D82-B011-A26686633743}" type="datetimeFigureOut">
               <a:rPr lang="hu-HU" smtClean="0"/>
-              <a:t>2018.10.01.</a:t>
+              <a:t>2018.10.02.</a:t>
             </a:fld>
             <a:endParaRPr lang="hu-HU"/>
           </a:p>
@@ -422,7 +423,7 @@
           <a:p>
             <a:fld id="{20357631-FF36-4D82-B011-A26686633743}" type="datetimeFigureOut">
               <a:rPr lang="hu-HU" smtClean="0"/>
-              <a:t>2018.10.01.</a:t>
+              <a:t>2018.10.02.</a:t>
             </a:fld>
             <a:endParaRPr lang="hu-HU"/>
           </a:p>
@@ -602,7 +603,7 @@
           <a:p>
             <a:fld id="{20357631-FF36-4D82-B011-A26686633743}" type="datetimeFigureOut">
               <a:rPr lang="hu-HU" smtClean="0"/>
-              <a:t>2018.10.01.</a:t>
+              <a:t>2018.10.02.</a:t>
             </a:fld>
             <a:endParaRPr lang="hu-HU"/>
           </a:p>
@@ -772,7 +773,7 @@
           <a:p>
             <a:fld id="{20357631-FF36-4D82-B011-A26686633743}" type="datetimeFigureOut">
               <a:rPr lang="hu-HU" smtClean="0"/>
-              <a:t>2018.10.01.</a:t>
+              <a:t>2018.10.02.</a:t>
             </a:fld>
             <a:endParaRPr lang="hu-HU"/>
           </a:p>
@@ -1018,7 +1019,7 @@
           <a:p>
             <a:fld id="{20357631-FF36-4D82-B011-A26686633743}" type="datetimeFigureOut">
               <a:rPr lang="hu-HU" smtClean="0"/>
-              <a:t>2018.10.01.</a:t>
+              <a:t>2018.10.02.</a:t>
             </a:fld>
             <a:endParaRPr lang="hu-HU"/>
           </a:p>
@@ -1250,7 +1251,7 @@
           <a:p>
             <a:fld id="{20357631-FF36-4D82-B011-A26686633743}" type="datetimeFigureOut">
               <a:rPr lang="hu-HU" smtClean="0"/>
-              <a:t>2018.10.01.</a:t>
+              <a:t>2018.10.02.</a:t>
             </a:fld>
             <a:endParaRPr lang="hu-HU"/>
           </a:p>
@@ -1617,7 +1618,7 @@
           <a:p>
             <a:fld id="{20357631-FF36-4D82-B011-A26686633743}" type="datetimeFigureOut">
               <a:rPr lang="hu-HU" smtClean="0"/>
-              <a:t>2018.10.01.</a:t>
+              <a:t>2018.10.02.</a:t>
             </a:fld>
             <a:endParaRPr lang="hu-HU"/>
           </a:p>
@@ -1735,7 +1736,7 @@
           <a:p>
             <a:fld id="{20357631-FF36-4D82-B011-A26686633743}" type="datetimeFigureOut">
               <a:rPr lang="hu-HU" smtClean="0"/>
-              <a:t>2018.10.01.</a:t>
+              <a:t>2018.10.02.</a:t>
             </a:fld>
             <a:endParaRPr lang="hu-HU"/>
           </a:p>
@@ -1830,7 +1831,7 @@
           <a:p>
             <a:fld id="{20357631-FF36-4D82-B011-A26686633743}" type="datetimeFigureOut">
               <a:rPr lang="hu-HU" smtClean="0"/>
-              <a:t>2018.10.01.</a:t>
+              <a:t>2018.10.02.</a:t>
             </a:fld>
             <a:endParaRPr lang="hu-HU"/>
           </a:p>
@@ -2107,7 +2108,7 @@
           <a:p>
             <a:fld id="{20357631-FF36-4D82-B011-A26686633743}" type="datetimeFigureOut">
               <a:rPr lang="hu-HU" smtClean="0"/>
-              <a:t>2018.10.01.</a:t>
+              <a:t>2018.10.02.</a:t>
             </a:fld>
             <a:endParaRPr lang="hu-HU"/>
           </a:p>
@@ -2360,7 +2361,7 @@
           <a:p>
             <a:fld id="{20357631-FF36-4D82-B011-A26686633743}" type="datetimeFigureOut">
               <a:rPr lang="hu-HU" smtClean="0"/>
-              <a:t>2018.10.01.</a:t>
+              <a:t>2018.10.02.</a:t>
             </a:fld>
             <a:endParaRPr lang="hu-HU"/>
           </a:p>
@@ -2578,7 +2579,7 @@
           <a:p>
             <a:fld id="{20357631-FF36-4D82-B011-A26686633743}" type="datetimeFigureOut">
               <a:rPr lang="hu-HU" smtClean="0"/>
-              <a:t>2018.10.01.</a:t>
+              <a:t>2018.10.02.</a:t>
             </a:fld>
             <a:endParaRPr lang="hu-HU"/>
           </a:p>
@@ -3074,6 +3075,36 @@
           </a:p>
         </p:txBody>
       </p:sp>
+      <p:sp>
+        <p:nvSpPr>
+          <p:cNvPr id="4" name="TextBox 3"/>
+          <p:cNvSpPr txBox="1"/>
+          <p:nvPr/>
+        </p:nvSpPr>
+        <p:spPr>
+          <a:xfrm>
+            <a:off x="9620519" y="6375043"/>
+            <a:ext cx="2421228" cy="369332"/>
+          </a:xfrm>
+          <a:prstGeom prst="rect">
+            <a:avLst/>
+          </a:prstGeom>
+          <a:noFill/>
+        </p:spPr>
+        <p:txBody>
+          <a:bodyPr wrap="square" rtlCol="0">
+            <a:spAutoFit/>
+          </a:bodyPr>
+          <a:lstStyle/>
+          <a:p>
+            <a:r>
+              <a:rPr lang="hu-HU" dirty="0" smtClean="0"/>
+              <a:t>Készítette: Nagy András</a:t>
+            </a:r>
+            <a:endParaRPr lang="hu-HU" dirty="0"/>
+          </a:p>
+        </p:txBody>
+      </p:sp>
     </p:spTree>
     <p:extLst>
       <p:ext uri="{BB962C8B-B14F-4D97-AF65-F5344CB8AC3E}">
@@ -3171,8 +3202,13 @@
           <a:p>
             <a:r>
               <a:rPr lang="hu-HU" dirty="0"/>
-              <a:t>8 óra munka, 8 óra pihenés.. (de ez is cégfüggő)</a:t>
-            </a:r>
+              <a:t>8 óra munka, 8 óra pihenés.. (de ez is </a:t>
+            </a:r>
+            <a:r>
+              <a:rPr lang="hu-HU" dirty="0" smtClean="0"/>
+              <a:t>cégfüggő, lehet rugalmasabb)</a:t>
+            </a:r>
+            <a:endParaRPr lang="hu-HU" dirty="0"/>
           </a:p>
           <a:p>
             <a:r>
@@ -3188,14 +3224,12 @@
           </a:p>
           <a:p>
             <a:r>
-              <a:rPr lang="hu-HU" dirty="0"/>
-              <a:t>Csapatmunka, feladatok szétválasztása, meetingek..</a:t>
-            </a:r>
-          </a:p>
-          <a:p>
-            <a:r>
-              <a:rPr lang="hu-HU" dirty="0"/>
-              <a:t>Szorosabb határidők</a:t>
+              <a:rPr lang="hu-HU" dirty="0" smtClean="0"/>
+              <a:t>Szorosabb </a:t>
+            </a:r>
+            <a:r>
+              <a:rPr lang="hu-HU" dirty="0"/>
+              <a:t>határidők</a:t>
             </a:r>
           </a:p>
           <a:p>
@@ -3219,8 +3253,23 @@
           <a:p>
             <a:r>
               <a:rPr lang="hu-HU" dirty="0"/>
-              <a:t>Az akadémia jobban az új dolgok létrehozásáról szól, az iparban nagy hangsúlyt kap a meglévő fejlesztések karbantartása..</a:t>
-            </a:r>
+              <a:t>Az akadémia jobban az új dolgok létrehozásáról szól, az iparban nagy hangsúlyt kap a meglévő fejlesztések karbantartása</a:t>
+            </a:r>
+            <a:r>
+              <a:rPr lang="hu-HU" dirty="0" smtClean="0"/>
+              <a:t>..</a:t>
+            </a:r>
+          </a:p>
+          <a:p>
+            <a:r>
+              <a:rPr lang="hu-HU" dirty="0"/>
+              <a:t>Csapatmunka, feladatok szétválasztása, meetingek</a:t>
+            </a:r>
+            <a:r>
+              <a:rPr lang="hu-HU" dirty="0" smtClean="0"/>
+              <a:t>..</a:t>
+            </a:r>
+            <a:endParaRPr lang="hu-HU" dirty="0"/>
           </a:p>
           <a:p>
             <a:r>
@@ -3240,6 +3289,222 @@
     <p:extLst>
       <p:ext uri="{BB962C8B-B14F-4D97-AF65-F5344CB8AC3E}">
         <p14:creationId xmlns:p14="http://schemas.microsoft.com/office/powerpoint/2010/main" val="69987778"/>
+      </p:ext>
+    </p:extLst>
+  </p:cSld>
+  <p:clrMapOvr>
+    <a:masterClrMapping/>
+  </p:clrMapOvr>
+</p:sld>
+</file>
+
+<file path=ppt/slides/slide11.xml><?xml version="1.0" encoding="utf-8"?>
+<p:sld xmlns:a="http://schemas.openxmlformats.org/drawingml/2006/main" xmlns:r="http://schemas.openxmlformats.org/officeDocument/2006/relationships" xmlns:p="http://schemas.openxmlformats.org/presentationml/2006/main">
+  <p:cSld>
+    <p:spTree>
+      <p:nvGrpSpPr>
+        <p:cNvPr id="1" name=""/>
+        <p:cNvGrpSpPr/>
+        <p:nvPr/>
+      </p:nvGrpSpPr>
+      <p:grpSpPr>
+        <a:xfrm>
+          <a:off x="0" y="0"/>
+          <a:ext cx="0" cy="0"/>
+          <a:chOff x="0" y="0"/>
+          <a:chExt cx="0" cy="0"/>
+        </a:xfrm>
+      </p:grpSpPr>
+      <p:sp>
+        <p:nvSpPr>
+          <p:cNvPr id="2" name="Title 1"/>
+          <p:cNvSpPr>
+            <a:spLocks noGrp="1"/>
+          </p:cNvSpPr>
+          <p:nvPr>
+            <p:ph type="title"/>
+          </p:nvPr>
+        </p:nvSpPr>
+        <p:spPr>
+          <a:xfrm>
+            <a:off x="838200" y="885387"/>
+            <a:ext cx="10515600" cy="1325563"/>
+          </a:xfrm>
+        </p:spPr>
+        <p:txBody>
+          <a:bodyPr>
+            <a:normAutofit/>
+          </a:bodyPr>
+          <a:lstStyle/>
+          <a:p>
+            <a:pPr algn="ctr"/>
+            <a:r>
+              <a:rPr lang="hu-HU" sz="6600" dirty="0" smtClean="0"/>
+              <a:t>Köszönöm a figyelmet!</a:t>
+            </a:r>
+            <a:endParaRPr lang="hu-HU" sz="6600" dirty="0"/>
+          </a:p>
+        </p:txBody>
+      </p:sp>
+      <p:sp>
+        <p:nvSpPr>
+          <p:cNvPr id="3" name="Content Placeholder 2"/>
+          <p:cNvSpPr>
+            <a:spLocks noGrp="1"/>
+          </p:cNvSpPr>
+          <p:nvPr>
+            <p:ph idx="1"/>
+          </p:nvPr>
+        </p:nvSpPr>
+        <p:spPr>
+          <a:xfrm>
+            <a:off x="838200" y="2393184"/>
+            <a:ext cx="10515600" cy="665326"/>
+          </a:xfrm>
+        </p:spPr>
+        <p:txBody>
+          <a:bodyPr>
+            <a:normAutofit/>
+          </a:bodyPr>
+          <a:lstStyle/>
+          <a:p>
+            <a:pPr marL="0" indent="0" algn="ctr">
+              <a:buNone/>
+            </a:pPr>
+            <a:r>
+              <a:rPr lang="hu-HU" sz="4000" dirty="0" smtClean="0"/>
+              <a:t>Kérdések..</a:t>
+            </a:r>
+          </a:p>
+        </p:txBody>
+      </p:sp>
+      <p:sp>
+        <p:nvSpPr>
+          <p:cNvPr id="4" name="TextBox 3"/>
+          <p:cNvSpPr txBox="1"/>
+          <p:nvPr/>
+        </p:nvSpPr>
+        <p:spPr>
+          <a:xfrm>
+            <a:off x="173420" y="5470635"/>
+            <a:ext cx="4351284" cy="1138773"/>
+          </a:xfrm>
+          <a:prstGeom prst="rect">
+            <a:avLst/>
+          </a:prstGeom>
+          <a:noFill/>
+        </p:spPr>
+        <p:txBody>
+          <a:bodyPr wrap="square" rtlCol="0">
+            <a:spAutoFit/>
+          </a:bodyPr>
+          <a:lstStyle/>
+          <a:p>
+            <a:r>
+              <a:rPr lang="hu-HU" sz="2800" dirty="0" smtClean="0"/>
+              <a:t>Elérhetőség: </a:t>
+            </a:r>
+          </a:p>
+          <a:p>
+            <a:r>
+              <a:rPr lang="hu-HU" sz="2000" dirty="0" smtClean="0"/>
+              <a:t>email: </a:t>
+            </a:r>
+            <a:r>
+              <a:rPr lang="hu-HU" sz="2000" i="1" dirty="0" smtClean="0">
+                <a:hlinkClick r:id="rId2"/>
+              </a:rPr>
+              <a:t>nagy.andras95@gmail.com</a:t>
+            </a:r>
+            <a:endParaRPr lang="hu-HU" sz="2000" i="1" dirty="0" smtClean="0"/>
+          </a:p>
+          <a:p>
+            <a:r>
+              <a:rPr lang="hu-HU" sz="2000" dirty="0" smtClean="0"/>
+              <a:t>Finna Imola tanárnőn keresztül..</a:t>
+            </a:r>
+            <a:endParaRPr lang="hu-HU" sz="2000" dirty="0"/>
+          </a:p>
+        </p:txBody>
+      </p:sp>
+      <p:sp>
+        <p:nvSpPr>
+          <p:cNvPr id="5" name="TextBox 4"/>
+          <p:cNvSpPr txBox="1"/>
+          <p:nvPr/>
+        </p:nvSpPr>
+        <p:spPr>
+          <a:xfrm>
+            <a:off x="173420" y="3631408"/>
+            <a:ext cx="4417453" cy="1231106"/>
+          </a:xfrm>
+          <a:prstGeom prst="rect">
+            <a:avLst/>
+          </a:prstGeom>
+          <a:noFill/>
+        </p:spPr>
+        <p:txBody>
+          <a:bodyPr wrap="square" rtlCol="0">
+            <a:spAutoFit/>
+          </a:bodyPr>
+          <a:lstStyle/>
+          <a:p>
+            <a:r>
+              <a:rPr lang="hu-HU" sz="2000" dirty="0" smtClean="0"/>
+              <a:t>Részletes információk:</a:t>
+            </a:r>
+          </a:p>
+          <a:p>
+            <a:r>
+              <a:rPr lang="hu-HU" dirty="0" smtClean="0"/>
+              <a:t>Felvi - </a:t>
+            </a:r>
+            <a:r>
+              <a:rPr lang="hu-HU" dirty="0" smtClean="0">
+                <a:hlinkClick r:id="rId3"/>
+              </a:rPr>
+              <a:t>https</a:t>
+            </a:r>
+            <a:r>
+              <a:rPr lang="hu-HU" dirty="0">
+                <a:hlinkClick r:id="rId3"/>
+              </a:rPr>
+              <a:t>://www.felvi.hu</a:t>
+            </a:r>
+            <a:r>
+              <a:rPr lang="hu-HU" dirty="0" smtClean="0">
+                <a:hlinkClick r:id="rId3"/>
+              </a:rPr>
+              <a:t>/</a:t>
+            </a:r>
+            <a:endParaRPr lang="hu-HU" dirty="0" smtClean="0"/>
+          </a:p>
+          <a:p>
+            <a:r>
+              <a:rPr lang="hu-HU" dirty="0"/>
+              <a:t>ELTE IK Tanrendek </a:t>
+            </a:r>
+            <a:r>
+              <a:rPr lang="hu-HU" dirty="0" smtClean="0"/>
+              <a:t>– </a:t>
+            </a:r>
+          </a:p>
+          <a:p>
+            <a:r>
+              <a:rPr lang="hu-HU" dirty="0" smtClean="0"/>
+              <a:t>https: //</a:t>
+            </a:r>
+            <a:r>
+              <a:rPr lang="hu-HU" dirty="0"/>
+              <a:t>www.inf.elte.hu/tantervihalok</a:t>
+            </a:r>
+          </a:p>
+        </p:txBody>
+      </p:sp>
+    </p:spTree>
+    <p:extLst>
+      <p:ext uri="{BB962C8B-B14F-4D97-AF65-F5344CB8AC3E}">
+        <p14:creationId xmlns:p14="http://schemas.microsoft.com/office/powerpoint/2010/main" val="4212423175"/>
       </p:ext>
     </p:extLst>
   </p:cSld>
@@ -3735,14 +4000,24 @@
           <a:p>
             <a:r>
               <a:rPr lang="hu-HU" dirty="0"/>
-              <a:t>Felősoktatási szakképzés (BGE-n van pl)</a:t>
-            </a:r>
-          </a:p>
-          <a:p>
-            <a:r>
-              <a:rPr lang="hu-HU" dirty="0"/>
-              <a:t>Cégek által hírdetett képzések, magániskolák.. (nincs releváns tapasztaltom)</a:t>
-            </a:r>
+              <a:t>Felősoktatási szakképzés (BGE-n van </a:t>
+            </a:r>
+            <a:r>
+              <a:rPr lang="hu-HU" dirty="0" smtClean="0"/>
+              <a:t>pl.)</a:t>
+            </a:r>
+            <a:endParaRPr lang="hu-HU" dirty="0"/>
+          </a:p>
+          <a:p>
+            <a:r>
+              <a:rPr lang="hu-HU" dirty="0"/>
+              <a:t>Cégek által hírdetett képzések, magániskolák.. (nincs releváns </a:t>
+            </a:r>
+            <a:r>
+              <a:rPr lang="hu-HU" dirty="0" smtClean="0"/>
+              <a:t>tapasztaltom, csak amit olvasok, néha hallok)</a:t>
+            </a:r>
+            <a:endParaRPr lang="hu-HU" dirty="0"/>
           </a:p>
           <a:p>
             <a:r>
@@ -3753,14 +4028,24 @@
           <a:p>
             <a:r>
               <a:rPr lang="hu-HU" dirty="0"/>
-              <a:t>Fontos, hogy ne erőltessük se a szakmát se az egyetemet, ha nem érezzük az affinitást magunkban.. (személyes tapasztalatok..)</a:t>
-            </a:r>
-          </a:p>
-          <a:p>
-            <a:r>
-              <a:rPr lang="hu-HU" dirty="0"/>
-              <a:t>Fél évig lehet meggondolni magad</a:t>
-            </a:r>
+              <a:t>Fontos, hogy ne erőltessük se a szakmát se az egyetemet, ha nem érezzük az affinitást magunkban.. </a:t>
+            </a:r>
+            <a:r>
+              <a:rPr lang="hu-HU" dirty="0" smtClean="0"/>
+              <a:t>(vannak tapasztalataim, miért ne)</a:t>
+            </a:r>
+            <a:endParaRPr lang="hu-HU" dirty="0"/>
+          </a:p>
+          <a:p>
+            <a:r>
+              <a:rPr lang="hu-HU" dirty="0"/>
+              <a:t>Fél évig lehet meggondolni </a:t>
+            </a:r>
+            <a:r>
+              <a:rPr lang="hu-HU" dirty="0" smtClean="0"/>
+              <a:t>magad állami képzésen</a:t>
+            </a:r>
+            <a:endParaRPr lang="hu-HU" dirty="0"/>
           </a:p>
         </p:txBody>
       </p:sp>
@@ -3804,39 +4089,46 @@
             <p:ph type="title"/>
           </p:nvPr>
         </p:nvSpPr>
-        <p:spPr/>
-        <p:txBody>
-          <a:bodyPr/>
-          <a:lstStyle/>
-          <a:p>
-            <a:pPr algn="ctr"/>
-            <a:r>
-              <a:rPr lang="hu-HU" dirty="0"/>
-              <a:t>Tantervi refom az ELTE-n</a:t>
-            </a:r>
-          </a:p>
-        </p:txBody>
-      </p:sp>
-      <p:sp>
-        <p:nvSpPr>
-          <p:cNvPr id="3" name="Content Placeholder 2"/>
-          <p:cNvSpPr>
-            <a:spLocks noGrp="1"/>
-          </p:cNvSpPr>
-          <p:nvPr>
-            <p:ph idx="1"/>
-          </p:nvPr>
-        </p:nvSpPr>
         <p:spPr>
           <a:xfrm>
-            <a:off x="838200" y="1825624"/>
-            <a:ext cx="10515600" cy="4691085"/>
+            <a:off x="838200" y="49300"/>
+            <a:ext cx="10515600" cy="1325563"/>
           </a:xfrm>
         </p:spPr>
         <p:txBody>
           <a:bodyPr/>
           <a:lstStyle/>
           <a:p>
+            <a:pPr algn="ctr"/>
+            <a:r>
+              <a:rPr lang="hu-HU" dirty="0"/>
+              <a:t>Tantervi refom az ELTE-n</a:t>
+            </a:r>
+          </a:p>
+        </p:txBody>
+      </p:sp>
+      <p:sp>
+        <p:nvSpPr>
+          <p:cNvPr id="3" name="Content Placeholder 2"/>
+          <p:cNvSpPr>
+            <a:spLocks noGrp="1"/>
+          </p:cNvSpPr>
+          <p:nvPr>
+            <p:ph idx="1"/>
+          </p:nvPr>
+        </p:nvSpPr>
+        <p:spPr>
+          <a:xfrm>
+            <a:off x="838200" y="1374863"/>
+            <a:ext cx="10515600" cy="4922906"/>
+          </a:xfrm>
+        </p:spPr>
+        <p:txBody>
+          <a:bodyPr>
+            <a:normAutofit fontScale="92500" lnSpcReduction="20000"/>
+          </a:bodyPr>
+          <a:lstStyle/>
+          <a:p>
             <a:r>
               <a:rPr lang="hu-HU" dirty="0"/>
               <a:t>Régi tanrendeben tanultam, de része voltam az egyik programozó tárgy tannyagfejlesztésének és oktatásának</a:t>
@@ -3873,8 +4165,69 @@
             <a:pPr lvl="1"/>
             <a:r>
               <a:rPr lang="hu-HU" dirty="0"/>
-              <a:t>Egy fokkal gyakorlatiasabb képzés felé mozdult el az egyetem</a:t>
-            </a:r>
+              <a:t>Egy fokkal gyakorlatiasabb képzés felé mozdult el az </a:t>
+            </a:r>
+            <a:r>
+              <a:rPr lang="hu-HU" dirty="0" smtClean="0"/>
+              <a:t>egyetem</a:t>
+            </a:r>
+            <a:endParaRPr lang="hu-HU" dirty="0"/>
+          </a:p>
+          <a:p>
+            <a:r>
+              <a:rPr lang="hu-HU" dirty="0" smtClean="0"/>
+              <a:t>Mesterképzések:</a:t>
+            </a:r>
+          </a:p>
+          <a:p>
+            <a:pPr lvl="1"/>
+            <a:r>
+              <a:rPr lang="hu-HU" dirty="0" smtClean="0"/>
+              <a:t>Megszűnt a modulrendszer, kb azt tanulsz, amit szeretnél</a:t>
+            </a:r>
+          </a:p>
+          <a:p>
+            <a:pPr lvl="1"/>
+            <a:r>
+              <a:rPr lang="hu-HU" dirty="0" smtClean="0"/>
+              <a:t>Tárgyak csoportjai</a:t>
+            </a:r>
+          </a:p>
+          <a:p>
+            <a:pPr lvl="2"/>
+            <a:r>
+              <a:rPr lang="hu-HU" dirty="0" smtClean="0"/>
+              <a:t>Matmatikai modellezős</a:t>
+            </a:r>
+          </a:p>
+          <a:p>
+            <a:pPr lvl="2"/>
+            <a:r>
+              <a:rPr lang="hu-HU" dirty="0" smtClean="0"/>
+              <a:t>Módszertanok, menedzseri ismertek</a:t>
+            </a:r>
+          </a:p>
+          <a:p>
+            <a:pPr lvl="2"/>
+            <a:r>
+              <a:rPr lang="hu-HU" dirty="0" smtClean="0"/>
+              <a:t>Új techonológiákat felvonultatók</a:t>
+            </a:r>
+          </a:p>
+          <a:p>
+            <a:pPr lvl="2"/>
+            <a:r>
+              <a:rPr lang="hu-HU" dirty="0" smtClean="0"/>
+              <a:t>Egyéb.. (kevésbé hasznosak..)</a:t>
+            </a:r>
+          </a:p>
+          <a:p>
+            <a:pPr lvl="2"/>
+            <a:endParaRPr lang="hu-HU" dirty="0" smtClean="0"/>
+          </a:p>
+          <a:p>
+            <a:pPr lvl="2"/>
+            <a:endParaRPr lang="hu-HU" dirty="0" smtClean="0"/>
           </a:p>
         </p:txBody>
       </p:sp>
@@ -3954,8 +4307,21 @@
           <a:p>
             <a:r>
               <a:rPr lang="hu-HU" dirty="0"/>
-              <a:t>Alapkzés eleje: Minél többet megpróbálasz fejlődni szakmailag a tárgyakon, valamint otthon</a:t>
-            </a:r>
+              <a:t>Alapkzés eleje: Minél többet megpróbálasz fejlődni szakmailag a </a:t>
+            </a:r>
+            <a:r>
+              <a:rPr lang="hu-HU" dirty="0" smtClean="0"/>
+              <a:t>tárgyaidon, </a:t>
+            </a:r>
+            <a:r>
+              <a:rPr lang="hu-HU" dirty="0"/>
+              <a:t>valamint </a:t>
+            </a:r>
+            <a:r>
+              <a:rPr lang="hu-HU" dirty="0" smtClean="0"/>
+              <a:t>önállóan (sok tárgyból beadandót is kell csinálni)</a:t>
+            </a:r>
+            <a:endParaRPr lang="hu-HU" dirty="0"/>
           </a:p>
           <a:p>
             <a:r>
@@ -3967,7 +4333,15 @@
             <a:pPr lvl="1"/>
             <a:r>
               <a:rPr lang="hu-HU" dirty="0"/>
-              <a:t>Bekerülhetsz projektmunkákba, akár pénzt is kaphatsz érte, a szakdogozatodat és a szakmai gyakorlatod is letduhatod ennek keretében</a:t>
+              <a:t>Bekerülhetsz projektmunkákba, akár pénzt is kaphatsz érte, a szakdogozatodat és a szakmai gyakorlatod is </a:t>
+            </a:r>
+            <a:r>
+              <a:rPr lang="hu-HU" dirty="0" smtClean="0"/>
+              <a:t>letudhatod </a:t>
+            </a:r>
+            <a:r>
+              <a:rPr lang="hu-HU" dirty="0"/>
+              <a:t>ennek keretében</a:t>
             </a:r>
           </a:p>
           <a:p>
@@ -4001,7 +4375,15 @@
             <a:pPr lvl="1"/>
             <a:r>
               <a:rPr lang="hu-HU" dirty="0"/>
-              <a:t>Továbbá a projektmunkát is folytathatod, valamint gyakorlatvezetéseket is vállalhatsz</a:t>
+              <a:t>Továbbá a projektmunkát is </a:t>
+            </a:r>
+            <a:r>
+              <a:rPr lang="hu-HU" dirty="0" smtClean="0"/>
+              <a:t>folytathatod vagy vállalsz, </a:t>
+            </a:r>
+            <a:r>
+              <a:rPr lang="hu-HU" dirty="0"/>
+              <a:t>valamint gyakorlatvezetéseket is vállalhatsz</a:t>
             </a:r>
           </a:p>
         </p:txBody>
@@ -4082,7 +4464,7 @@
         </p:spPr>
         <p:txBody>
           <a:bodyPr>
-            <a:normAutofit fontScale="92500" lnSpcReduction="10000"/>
+            <a:normAutofit fontScale="92500" lnSpcReduction="20000"/>
           </a:bodyPr>
           <a:lstStyle/>
           <a:p>
@@ -4136,8 +4518,13 @@
           <a:p>
             <a:r>
               <a:rPr lang="hu-HU" dirty="0"/>
-              <a:t>Az ötleteidet valósíthatod meg, és általában nem egy ügyfél kivánságát</a:t>
-            </a:r>
+              <a:t>Az ötleteidet valósíthatod meg, és általában nem egy ügyfél </a:t>
+            </a:r>
+            <a:r>
+              <a:rPr lang="hu-HU" dirty="0" smtClean="0"/>
+              <a:t>kivánságát (emiatt ritkán vanak jól definiált feladatok)</a:t>
+            </a:r>
+            <a:endParaRPr lang="hu-HU" dirty="0"/>
           </a:p>
           <a:p>
             <a:r>

</xml_diff>